<commit_message>
few changes on the slide
</commit_message>
<xml_diff>
--- a/bigbluebutton-tests/playwright/core/media/BBB.pptx
+++ b/bigbluebutton-tests/playwright/core/media/BBB.pptx
@@ -13,7 +13,7 @@
     <p:sldId id="261" r:id="rId8"/>
   </p:sldIdLst>
   <p:sldSz cx="12192000" cy="6858000"/>
-  <p:notesSz cx="7559675" cy="10691812"/>
+  <p:notesSz cx="7559675" cy="10691813"/>
 </p:presentation>
 </file>
 
@@ -74,14 +74,20 @@
           <a:prstGeom prst="rect">
             <a:avLst/>
           </a:prstGeom>
+          <a:noFill/>
+          <a:ln w="0">
+            <a:noFill/>
+          </a:ln>
         </p:spPr>
         <p:txBody>
           <a:bodyPr lIns="0" rIns="0" tIns="0" bIns="0" anchor="ctr">
             <a:noAutofit/>
           </a:bodyPr>
           <a:p>
-            <a:pPr algn="ctr"/>
-            <a:endParaRPr b="0" lang="en-US" sz="4400" spc="-1" strike="noStrike">
+            <a:pPr algn="ctr">
+              <a:buNone/>
+            </a:pPr>
+            <a:endParaRPr b="0" lang="pt-BR" sz="4400" spc="-1" strike="noStrike">
               <a:latin typeface="Arial"/>
             </a:endParaRPr>
           </a:p>
@@ -94,7 +100,7 @@
             <a:spLocks noGrp="1"/>
           </p:cNvSpPr>
           <p:nvPr>
-            <p:ph type="body"/>
+            <p:ph/>
           </p:nvPr>
         </p:nvSpPr>
         <p:spPr>
@@ -105,13 +111,17 @@
           <a:prstGeom prst="rect">
             <a:avLst/>
           </a:prstGeom>
-        </p:spPr>
-        <p:txBody>
-          <a:bodyPr lIns="0" rIns="0" tIns="0" bIns="0">
+          <a:noFill/>
+          <a:ln w="0">
+            <a:noFill/>
+          </a:ln>
+        </p:spPr>
+        <p:txBody>
+          <a:bodyPr lIns="0" rIns="0" tIns="0" bIns="0" anchor="t">
             <a:normAutofit/>
           </a:bodyPr>
           <a:p>
-            <a:endParaRPr b="0" lang="en-US" sz="3200" spc="-1" strike="noStrike">
+            <a:endParaRPr b="0" lang="pt-BR" sz="3200" spc="-1" strike="noStrike">
               <a:latin typeface="Arial"/>
             </a:endParaRPr>
           </a:p>
@@ -124,7 +134,7 @@
             <a:spLocks noGrp="1"/>
           </p:cNvSpPr>
           <p:nvPr>
-            <p:ph type="body"/>
+            <p:ph/>
           </p:nvPr>
         </p:nvSpPr>
         <p:spPr>
@@ -135,13 +145,17 @@
           <a:prstGeom prst="rect">
             <a:avLst/>
           </a:prstGeom>
-        </p:spPr>
-        <p:txBody>
-          <a:bodyPr lIns="0" rIns="0" tIns="0" bIns="0">
+          <a:noFill/>
+          <a:ln w="0">
+            <a:noFill/>
+          </a:ln>
+        </p:spPr>
+        <p:txBody>
+          <a:bodyPr lIns="0" rIns="0" tIns="0" bIns="0" anchor="t">
             <a:normAutofit/>
           </a:bodyPr>
           <a:p>
-            <a:endParaRPr b="0" lang="en-US" sz="3200" spc="-1" strike="noStrike">
+            <a:endParaRPr b="0" lang="pt-BR" sz="3200" spc="-1" strike="noStrike">
               <a:latin typeface="Arial"/>
             </a:endParaRPr>
           </a:p>
@@ -187,14 +201,20 @@
           <a:prstGeom prst="rect">
             <a:avLst/>
           </a:prstGeom>
+          <a:noFill/>
+          <a:ln w="0">
+            <a:noFill/>
+          </a:ln>
         </p:spPr>
         <p:txBody>
           <a:bodyPr lIns="0" rIns="0" tIns="0" bIns="0" anchor="ctr">
             <a:noAutofit/>
           </a:bodyPr>
           <a:p>
-            <a:pPr algn="ctr"/>
-            <a:endParaRPr b="0" lang="en-US" sz="4400" spc="-1" strike="noStrike">
+            <a:pPr algn="ctr">
+              <a:buNone/>
+            </a:pPr>
+            <a:endParaRPr b="0" lang="pt-BR" sz="4400" spc="-1" strike="noStrike">
               <a:latin typeface="Arial"/>
             </a:endParaRPr>
           </a:p>
@@ -207,7 +227,7 @@
             <a:spLocks noGrp="1"/>
           </p:cNvSpPr>
           <p:nvPr>
-            <p:ph type="body"/>
+            <p:ph/>
           </p:nvPr>
         </p:nvSpPr>
         <p:spPr>
@@ -218,13 +238,17 @@
           <a:prstGeom prst="rect">
             <a:avLst/>
           </a:prstGeom>
-        </p:spPr>
-        <p:txBody>
-          <a:bodyPr lIns="0" rIns="0" tIns="0" bIns="0">
+          <a:noFill/>
+          <a:ln w="0">
+            <a:noFill/>
+          </a:ln>
+        </p:spPr>
+        <p:txBody>
+          <a:bodyPr lIns="0" rIns="0" tIns="0" bIns="0" anchor="t">
             <a:normAutofit/>
           </a:bodyPr>
           <a:p>
-            <a:endParaRPr b="0" lang="en-US" sz="3200" spc="-1" strike="noStrike">
+            <a:endParaRPr b="0" lang="pt-BR" sz="3200" spc="-1" strike="noStrike">
               <a:latin typeface="Arial"/>
             </a:endParaRPr>
           </a:p>
@@ -237,7 +261,7 @@
             <a:spLocks noGrp="1"/>
           </p:cNvSpPr>
           <p:nvPr>
-            <p:ph type="body"/>
+            <p:ph/>
           </p:nvPr>
         </p:nvSpPr>
         <p:spPr>
@@ -248,13 +272,17 @@
           <a:prstGeom prst="rect">
             <a:avLst/>
           </a:prstGeom>
-        </p:spPr>
-        <p:txBody>
-          <a:bodyPr lIns="0" rIns="0" tIns="0" bIns="0">
+          <a:noFill/>
+          <a:ln w="0">
+            <a:noFill/>
+          </a:ln>
+        </p:spPr>
+        <p:txBody>
+          <a:bodyPr lIns="0" rIns="0" tIns="0" bIns="0" anchor="t">
             <a:normAutofit/>
           </a:bodyPr>
           <a:p>
-            <a:endParaRPr b="0" lang="en-US" sz="3200" spc="-1" strike="noStrike">
+            <a:endParaRPr b="0" lang="pt-BR" sz="3200" spc="-1" strike="noStrike">
               <a:latin typeface="Arial"/>
             </a:endParaRPr>
           </a:p>
@@ -267,7 +295,7 @@
             <a:spLocks noGrp="1"/>
           </p:cNvSpPr>
           <p:nvPr>
-            <p:ph type="body"/>
+            <p:ph/>
           </p:nvPr>
         </p:nvSpPr>
         <p:spPr>
@@ -278,13 +306,17 @@
           <a:prstGeom prst="rect">
             <a:avLst/>
           </a:prstGeom>
-        </p:spPr>
-        <p:txBody>
-          <a:bodyPr lIns="0" rIns="0" tIns="0" bIns="0">
+          <a:noFill/>
+          <a:ln w="0">
+            <a:noFill/>
+          </a:ln>
+        </p:spPr>
+        <p:txBody>
+          <a:bodyPr lIns="0" rIns="0" tIns="0" bIns="0" anchor="t">
             <a:normAutofit/>
           </a:bodyPr>
           <a:p>
-            <a:endParaRPr b="0" lang="en-US" sz="3200" spc="-1" strike="noStrike">
+            <a:endParaRPr b="0" lang="pt-BR" sz="3200" spc="-1" strike="noStrike">
               <a:latin typeface="Arial"/>
             </a:endParaRPr>
           </a:p>
@@ -297,7 +329,7 @@
             <a:spLocks noGrp="1"/>
           </p:cNvSpPr>
           <p:nvPr>
-            <p:ph type="body"/>
+            <p:ph/>
           </p:nvPr>
         </p:nvSpPr>
         <p:spPr>
@@ -308,13 +340,17 @@
           <a:prstGeom prst="rect">
             <a:avLst/>
           </a:prstGeom>
-        </p:spPr>
-        <p:txBody>
-          <a:bodyPr lIns="0" rIns="0" tIns="0" bIns="0">
+          <a:noFill/>
+          <a:ln w="0">
+            <a:noFill/>
+          </a:ln>
+        </p:spPr>
+        <p:txBody>
+          <a:bodyPr lIns="0" rIns="0" tIns="0" bIns="0" anchor="t">
             <a:normAutofit/>
           </a:bodyPr>
           <a:p>
-            <a:endParaRPr b="0" lang="en-US" sz="3200" spc="-1" strike="noStrike">
+            <a:endParaRPr b="0" lang="pt-BR" sz="3200" spc="-1" strike="noStrike">
               <a:latin typeface="Arial"/>
             </a:endParaRPr>
           </a:p>
@@ -360,14 +396,20 @@
           <a:prstGeom prst="rect">
             <a:avLst/>
           </a:prstGeom>
+          <a:noFill/>
+          <a:ln w="0">
+            <a:noFill/>
+          </a:ln>
         </p:spPr>
         <p:txBody>
           <a:bodyPr lIns="0" rIns="0" tIns="0" bIns="0" anchor="ctr">
             <a:noAutofit/>
           </a:bodyPr>
           <a:p>
-            <a:pPr algn="ctr"/>
-            <a:endParaRPr b="0" lang="en-US" sz="4400" spc="-1" strike="noStrike">
+            <a:pPr algn="ctr">
+              <a:buNone/>
+            </a:pPr>
+            <a:endParaRPr b="0" lang="pt-BR" sz="4400" spc="-1" strike="noStrike">
               <a:latin typeface="Arial"/>
             </a:endParaRPr>
           </a:p>
@@ -380,7 +422,7 @@
             <a:spLocks noGrp="1"/>
           </p:cNvSpPr>
           <p:nvPr>
-            <p:ph type="body"/>
+            <p:ph/>
           </p:nvPr>
         </p:nvSpPr>
         <p:spPr>
@@ -391,13 +433,17 @@
           <a:prstGeom prst="rect">
             <a:avLst/>
           </a:prstGeom>
-        </p:spPr>
-        <p:txBody>
-          <a:bodyPr lIns="0" rIns="0" tIns="0" bIns="0">
+          <a:noFill/>
+          <a:ln w="0">
+            <a:noFill/>
+          </a:ln>
+        </p:spPr>
+        <p:txBody>
+          <a:bodyPr lIns="0" rIns="0" tIns="0" bIns="0" anchor="t">
             <a:normAutofit/>
           </a:bodyPr>
           <a:p>
-            <a:endParaRPr b="0" lang="en-US" sz="3200" spc="-1" strike="noStrike">
+            <a:endParaRPr b="0" lang="pt-BR" sz="3200" spc="-1" strike="noStrike">
               <a:latin typeface="Arial"/>
             </a:endParaRPr>
           </a:p>
@@ -410,7 +456,7 @@
             <a:spLocks noGrp="1"/>
           </p:cNvSpPr>
           <p:nvPr>
-            <p:ph type="body"/>
+            <p:ph/>
           </p:nvPr>
         </p:nvSpPr>
         <p:spPr>
@@ -421,13 +467,17 @@
           <a:prstGeom prst="rect">
             <a:avLst/>
           </a:prstGeom>
-        </p:spPr>
-        <p:txBody>
-          <a:bodyPr lIns="0" rIns="0" tIns="0" bIns="0">
+          <a:noFill/>
+          <a:ln w="0">
+            <a:noFill/>
+          </a:ln>
+        </p:spPr>
+        <p:txBody>
+          <a:bodyPr lIns="0" rIns="0" tIns="0" bIns="0" anchor="t">
             <a:normAutofit/>
           </a:bodyPr>
           <a:p>
-            <a:endParaRPr b="0" lang="en-US" sz="3200" spc="-1" strike="noStrike">
+            <a:endParaRPr b="0" lang="pt-BR" sz="3200" spc="-1" strike="noStrike">
               <a:latin typeface="Arial"/>
             </a:endParaRPr>
           </a:p>
@@ -440,7 +490,7 @@
             <a:spLocks noGrp="1"/>
           </p:cNvSpPr>
           <p:nvPr>
-            <p:ph type="body"/>
+            <p:ph/>
           </p:nvPr>
         </p:nvSpPr>
         <p:spPr>
@@ -451,13 +501,17 @@
           <a:prstGeom prst="rect">
             <a:avLst/>
           </a:prstGeom>
-        </p:spPr>
-        <p:txBody>
-          <a:bodyPr lIns="0" rIns="0" tIns="0" bIns="0">
+          <a:noFill/>
+          <a:ln w="0">
+            <a:noFill/>
+          </a:ln>
+        </p:spPr>
+        <p:txBody>
+          <a:bodyPr lIns="0" rIns="0" tIns="0" bIns="0" anchor="t">
             <a:normAutofit/>
           </a:bodyPr>
           <a:p>
-            <a:endParaRPr b="0" lang="en-US" sz="3200" spc="-1" strike="noStrike">
+            <a:endParaRPr b="0" lang="pt-BR" sz="3200" spc="-1" strike="noStrike">
               <a:latin typeface="Arial"/>
             </a:endParaRPr>
           </a:p>
@@ -470,7 +524,7 @@
             <a:spLocks noGrp="1"/>
           </p:cNvSpPr>
           <p:nvPr>
-            <p:ph type="body"/>
+            <p:ph/>
           </p:nvPr>
         </p:nvSpPr>
         <p:spPr>
@@ -481,13 +535,17 @@
           <a:prstGeom prst="rect">
             <a:avLst/>
           </a:prstGeom>
-        </p:spPr>
-        <p:txBody>
-          <a:bodyPr lIns="0" rIns="0" tIns="0" bIns="0">
+          <a:noFill/>
+          <a:ln w="0">
+            <a:noFill/>
+          </a:ln>
+        </p:spPr>
+        <p:txBody>
+          <a:bodyPr lIns="0" rIns="0" tIns="0" bIns="0" anchor="t">
             <a:normAutofit/>
           </a:bodyPr>
           <a:p>
-            <a:endParaRPr b="0" lang="en-US" sz="3200" spc="-1" strike="noStrike">
+            <a:endParaRPr b="0" lang="pt-BR" sz="3200" spc="-1" strike="noStrike">
               <a:latin typeface="Arial"/>
             </a:endParaRPr>
           </a:p>
@@ -500,7 +558,7 @@
             <a:spLocks noGrp="1"/>
           </p:cNvSpPr>
           <p:nvPr>
-            <p:ph type="body"/>
+            <p:ph/>
           </p:nvPr>
         </p:nvSpPr>
         <p:spPr>
@@ -511,13 +569,17 @@
           <a:prstGeom prst="rect">
             <a:avLst/>
           </a:prstGeom>
-        </p:spPr>
-        <p:txBody>
-          <a:bodyPr lIns="0" rIns="0" tIns="0" bIns="0">
+          <a:noFill/>
+          <a:ln w="0">
+            <a:noFill/>
+          </a:ln>
+        </p:spPr>
+        <p:txBody>
+          <a:bodyPr lIns="0" rIns="0" tIns="0" bIns="0" anchor="t">
             <a:normAutofit/>
           </a:bodyPr>
           <a:p>
-            <a:endParaRPr b="0" lang="en-US" sz="3200" spc="-1" strike="noStrike">
+            <a:endParaRPr b="0" lang="pt-BR" sz="3200" spc="-1" strike="noStrike">
               <a:latin typeface="Arial"/>
             </a:endParaRPr>
           </a:p>
@@ -530,7 +592,7 @@
             <a:spLocks noGrp="1"/>
           </p:cNvSpPr>
           <p:nvPr>
-            <p:ph type="body"/>
+            <p:ph/>
           </p:nvPr>
         </p:nvSpPr>
         <p:spPr>
@@ -541,13 +603,17 @@
           <a:prstGeom prst="rect">
             <a:avLst/>
           </a:prstGeom>
-        </p:spPr>
-        <p:txBody>
-          <a:bodyPr lIns="0" rIns="0" tIns="0" bIns="0">
+          <a:noFill/>
+          <a:ln w="0">
+            <a:noFill/>
+          </a:ln>
+        </p:spPr>
+        <p:txBody>
+          <a:bodyPr lIns="0" rIns="0" tIns="0" bIns="0" anchor="t">
             <a:normAutofit/>
           </a:bodyPr>
           <a:p>
-            <a:endParaRPr b="0" lang="en-US" sz="3200" spc="-1" strike="noStrike">
+            <a:endParaRPr b="0" lang="pt-BR" sz="3200" spc="-1" strike="noStrike">
               <a:latin typeface="Arial"/>
             </a:endParaRPr>
           </a:p>
@@ -593,14 +659,20 @@
           <a:prstGeom prst="rect">
             <a:avLst/>
           </a:prstGeom>
+          <a:noFill/>
+          <a:ln w="0">
+            <a:noFill/>
+          </a:ln>
         </p:spPr>
         <p:txBody>
           <a:bodyPr lIns="0" rIns="0" tIns="0" bIns="0" anchor="ctr">
             <a:noAutofit/>
           </a:bodyPr>
           <a:p>
-            <a:pPr algn="ctr"/>
-            <a:endParaRPr b="0" lang="en-US" sz="4400" spc="-1" strike="noStrike">
+            <a:pPr algn="ctr">
+              <a:buNone/>
+            </a:pPr>
+            <a:endParaRPr b="0" lang="pt-BR" sz="4400" spc="-1" strike="noStrike">
               <a:latin typeface="Arial"/>
             </a:endParaRPr>
           </a:p>
@@ -624,14 +696,20 @@
           <a:prstGeom prst="rect">
             <a:avLst/>
           </a:prstGeom>
+          <a:noFill/>
+          <a:ln w="0">
+            <a:noFill/>
+          </a:ln>
         </p:spPr>
         <p:txBody>
           <a:bodyPr lIns="0" rIns="0" tIns="0" bIns="0" anchor="ctr">
             <a:noAutofit/>
           </a:bodyPr>
           <a:p>
-            <a:pPr algn="ctr"/>
-            <a:endParaRPr b="0" lang="en-US" sz="3200" spc="-1" strike="noStrike">
+            <a:pPr algn="ctr">
+              <a:buNone/>
+            </a:pPr>
+            <a:endParaRPr b="0" lang="pt-BR" sz="3200" spc="-1" strike="noStrike">
               <a:latin typeface="Arial"/>
             </a:endParaRPr>
           </a:p>
@@ -677,14 +755,20 @@
           <a:prstGeom prst="rect">
             <a:avLst/>
           </a:prstGeom>
+          <a:noFill/>
+          <a:ln w="0">
+            <a:noFill/>
+          </a:ln>
         </p:spPr>
         <p:txBody>
           <a:bodyPr lIns="0" rIns="0" tIns="0" bIns="0" anchor="ctr">
             <a:noAutofit/>
           </a:bodyPr>
           <a:p>
-            <a:pPr algn="ctr"/>
-            <a:endParaRPr b="0" lang="en-US" sz="4400" spc="-1" strike="noStrike">
+            <a:pPr algn="ctr">
+              <a:buNone/>
+            </a:pPr>
+            <a:endParaRPr b="0" lang="pt-BR" sz="4400" spc="-1" strike="noStrike">
               <a:latin typeface="Arial"/>
             </a:endParaRPr>
           </a:p>
@@ -697,7 +781,7 @@
             <a:spLocks noGrp="1"/>
           </p:cNvSpPr>
           <p:nvPr>
-            <p:ph type="body"/>
+            <p:ph/>
           </p:nvPr>
         </p:nvSpPr>
         <p:spPr>
@@ -708,13 +792,17 @@
           <a:prstGeom prst="rect">
             <a:avLst/>
           </a:prstGeom>
-        </p:spPr>
-        <p:txBody>
-          <a:bodyPr lIns="0" rIns="0" tIns="0" bIns="0">
+          <a:noFill/>
+          <a:ln w="0">
+            <a:noFill/>
+          </a:ln>
+        </p:spPr>
+        <p:txBody>
+          <a:bodyPr lIns="0" rIns="0" tIns="0" bIns="0" anchor="t">
             <a:normAutofit/>
           </a:bodyPr>
           <a:p>
-            <a:endParaRPr b="0" lang="en-US" sz="3200" spc="-1" strike="noStrike">
+            <a:endParaRPr b="0" lang="pt-BR" sz="3200" spc="-1" strike="noStrike">
               <a:latin typeface="Arial"/>
             </a:endParaRPr>
           </a:p>
@@ -760,14 +848,20 @@
           <a:prstGeom prst="rect">
             <a:avLst/>
           </a:prstGeom>
+          <a:noFill/>
+          <a:ln w="0">
+            <a:noFill/>
+          </a:ln>
         </p:spPr>
         <p:txBody>
           <a:bodyPr lIns="0" rIns="0" tIns="0" bIns="0" anchor="ctr">
             <a:noAutofit/>
           </a:bodyPr>
           <a:p>
-            <a:pPr algn="ctr"/>
-            <a:endParaRPr b="0" lang="en-US" sz="4400" spc="-1" strike="noStrike">
+            <a:pPr algn="ctr">
+              <a:buNone/>
+            </a:pPr>
+            <a:endParaRPr b="0" lang="pt-BR" sz="4400" spc="-1" strike="noStrike">
               <a:latin typeface="Arial"/>
             </a:endParaRPr>
           </a:p>
@@ -780,7 +874,7 @@
             <a:spLocks noGrp="1"/>
           </p:cNvSpPr>
           <p:nvPr>
-            <p:ph type="body"/>
+            <p:ph/>
           </p:nvPr>
         </p:nvSpPr>
         <p:spPr>
@@ -791,13 +885,17 @@
           <a:prstGeom prst="rect">
             <a:avLst/>
           </a:prstGeom>
-        </p:spPr>
-        <p:txBody>
-          <a:bodyPr lIns="0" rIns="0" tIns="0" bIns="0">
+          <a:noFill/>
+          <a:ln w="0">
+            <a:noFill/>
+          </a:ln>
+        </p:spPr>
+        <p:txBody>
+          <a:bodyPr lIns="0" rIns="0" tIns="0" bIns="0" anchor="t">
             <a:normAutofit/>
           </a:bodyPr>
           <a:p>
-            <a:endParaRPr b="0" lang="en-US" sz="3200" spc="-1" strike="noStrike">
+            <a:endParaRPr b="0" lang="pt-BR" sz="3200" spc="-1" strike="noStrike">
               <a:latin typeface="Arial"/>
             </a:endParaRPr>
           </a:p>
@@ -810,7 +908,7 @@
             <a:spLocks noGrp="1"/>
           </p:cNvSpPr>
           <p:nvPr>
-            <p:ph type="body"/>
+            <p:ph/>
           </p:nvPr>
         </p:nvSpPr>
         <p:spPr>
@@ -821,13 +919,17 @@
           <a:prstGeom prst="rect">
             <a:avLst/>
           </a:prstGeom>
-        </p:spPr>
-        <p:txBody>
-          <a:bodyPr lIns="0" rIns="0" tIns="0" bIns="0">
+          <a:noFill/>
+          <a:ln w="0">
+            <a:noFill/>
+          </a:ln>
+        </p:spPr>
+        <p:txBody>
+          <a:bodyPr lIns="0" rIns="0" tIns="0" bIns="0" anchor="t">
             <a:normAutofit/>
           </a:bodyPr>
           <a:p>
-            <a:endParaRPr b="0" lang="en-US" sz="3200" spc="-1" strike="noStrike">
+            <a:endParaRPr b="0" lang="pt-BR" sz="3200" spc="-1" strike="noStrike">
               <a:latin typeface="Arial"/>
             </a:endParaRPr>
           </a:p>
@@ -873,14 +975,20 @@
           <a:prstGeom prst="rect">
             <a:avLst/>
           </a:prstGeom>
+          <a:noFill/>
+          <a:ln w="0">
+            <a:noFill/>
+          </a:ln>
         </p:spPr>
         <p:txBody>
           <a:bodyPr lIns="0" rIns="0" tIns="0" bIns="0" anchor="ctr">
             <a:noAutofit/>
           </a:bodyPr>
           <a:p>
-            <a:pPr algn="ctr"/>
-            <a:endParaRPr b="0" lang="en-US" sz="4400" spc="-1" strike="noStrike">
+            <a:pPr algn="ctr">
+              <a:buNone/>
+            </a:pPr>
+            <a:endParaRPr b="0" lang="pt-BR" sz="4400" spc="-1" strike="noStrike">
               <a:latin typeface="Arial"/>
             </a:endParaRPr>
           </a:p>
@@ -926,14 +1034,20 @@
           <a:prstGeom prst="rect">
             <a:avLst/>
           </a:prstGeom>
+          <a:noFill/>
+          <a:ln w="0">
+            <a:noFill/>
+          </a:ln>
         </p:spPr>
         <p:txBody>
           <a:bodyPr lIns="0" rIns="0" tIns="0" bIns="0" anchor="ctr">
             <a:noAutofit/>
           </a:bodyPr>
           <a:p>
-            <a:pPr algn="ctr"/>
-            <a:endParaRPr b="0" lang="en-US" sz="3200" spc="-1" strike="noStrike">
+            <a:pPr algn="ctr">
+              <a:buNone/>
+            </a:pPr>
+            <a:endParaRPr b="0" lang="pt-BR" sz="3200" spc="-1" strike="noStrike">
               <a:latin typeface="Arial"/>
             </a:endParaRPr>
           </a:p>
@@ -979,14 +1093,20 @@
           <a:prstGeom prst="rect">
             <a:avLst/>
           </a:prstGeom>
+          <a:noFill/>
+          <a:ln w="0">
+            <a:noFill/>
+          </a:ln>
         </p:spPr>
         <p:txBody>
           <a:bodyPr lIns="0" rIns="0" tIns="0" bIns="0" anchor="ctr">
             <a:noAutofit/>
           </a:bodyPr>
           <a:p>
-            <a:pPr algn="ctr"/>
-            <a:endParaRPr b="0" lang="en-US" sz="4400" spc="-1" strike="noStrike">
+            <a:pPr algn="ctr">
+              <a:buNone/>
+            </a:pPr>
+            <a:endParaRPr b="0" lang="pt-BR" sz="4400" spc="-1" strike="noStrike">
               <a:latin typeface="Arial"/>
             </a:endParaRPr>
           </a:p>
@@ -999,7 +1119,7 @@
             <a:spLocks noGrp="1"/>
           </p:cNvSpPr>
           <p:nvPr>
-            <p:ph type="body"/>
+            <p:ph/>
           </p:nvPr>
         </p:nvSpPr>
         <p:spPr>
@@ -1010,13 +1130,17 @@
           <a:prstGeom prst="rect">
             <a:avLst/>
           </a:prstGeom>
-        </p:spPr>
-        <p:txBody>
-          <a:bodyPr lIns="0" rIns="0" tIns="0" bIns="0">
+          <a:noFill/>
+          <a:ln w="0">
+            <a:noFill/>
+          </a:ln>
+        </p:spPr>
+        <p:txBody>
+          <a:bodyPr lIns="0" rIns="0" tIns="0" bIns="0" anchor="t">
             <a:normAutofit/>
           </a:bodyPr>
           <a:p>
-            <a:endParaRPr b="0" lang="en-US" sz="3200" spc="-1" strike="noStrike">
+            <a:endParaRPr b="0" lang="pt-BR" sz="3200" spc="-1" strike="noStrike">
               <a:latin typeface="Arial"/>
             </a:endParaRPr>
           </a:p>
@@ -1029,7 +1153,7 @@
             <a:spLocks noGrp="1"/>
           </p:cNvSpPr>
           <p:nvPr>
-            <p:ph type="body"/>
+            <p:ph/>
           </p:nvPr>
         </p:nvSpPr>
         <p:spPr>
@@ -1040,13 +1164,17 @@
           <a:prstGeom prst="rect">
             <a:avLst/>
           </a:prstGeom>
-        </p:spPr>
-        <p:txBody>
-          <a:bodyPr lIns="0" rIns="0" tIns="0" bIns="0">
+          <a:noFill/>
+          <a:ln w="0">
+            <a:noFill/>
+          </a:ln>
+        </p:spPr>
+        <p:txBody>
+          <a:bodyPr lIns="0" rIns="0" tIns="0" bIns="0" anchor="t">
             <a:normAutofit/>
           </a:bodyPr>
           <a:p>
-            <a:endParaRPr b="0" lang="en-US" sz="3200" spc="-1" strike="noStrike">
+            <a:endParaRPr b="0" lang="pt-BR" sz="3200" spc="-1" strike="noStrike">
               <a:latin typeface="Arial"/>
             </a:endParaRPr>
           </a:p>
@@ -1059,7 +1187,7 @@
             <a:spLocks noGrp="1"/>
           </p:cNvSpPr>
           <p:nvPr>
-            <p:ph type="body"/>
+            <p:ph/>
           </p:nvPr>
         </p:nvSpPr>
         <p:spPr>
@@ -1070,13 +1198,17 @@
           <a:prstGeom prst="rect">
             <a:avLst/>
           </a:prstGeom>
-        </p:spPr>
-        <p:txBody>
-          <a:bodyPr lIns="0" rIns="0" tIns="0" bIns="0">
+          <a:noFill/>
+          <a:ln w="0">
+            <a:noFill/>
+          </a:ln>
+        </p:spPr>
+        <p:txBody>
+          <a:bodyPr lIns="0" rIns="0" tIns="0" bIns="0" anchor="t">
             <a:normAutofit/>
           </a:bodyPr>
           <a:p>
-            <a:endParaRPr b="0" lang="en-US" sz="3200" spc="-1" strike="noStrike">
+            <a:endParaRPr b="0" lang="pt-BR" sz="3200" spc="-1" strike="noStrike">
               <a:latin typeface="Arial"/>
             </a:endParaRPr>
           </a:p>
@@ -1122,14 +1254,20 @@
           <a:prstGeom prst="rect">
             <a:avLst/>
           </a:prstGeom>
+          <a:noFill/>
+          <a:ln w="0">
+            <a:noFill/>
+          </a:ln>
         </p:spPr>
         <p:txBody>
           <a:bodyPr lIns="0" rIns="0" tIns="0" bIns="0" anchor="ctr">
             <a:noAutofit/>
           </a:bodyPr>
           <a:p>
-            <a:pPr algn="ctr"/>
-            <a:endParaRPr b="0" lang="en-US" sz="4400" spc="-1" strike="noStrike">
+            <a:pPr algn="ctr">
+              <a:buNone/>
+            </a:pPr>
+            <a:endParaRPr b="0" lang="pt-BR" sz="4400" spc="-1" strike="noStrike">
               <a:latin typeface="Arial"/>
             </a:endParaRPr>
           </a:p>
@@ -1142,7 +1280,7 @@
             <a:spLocks noGrp="1"/>
           </p:cNvSpPr>
           <p:nvPr>
-            <p:ph type="body"/>
+            <p:ph/>
           </p:nvPr>
         </p:nvSpPr>
         <p:spPr>
@@ -1153,13 +1291,17 @@
           <a:prstGeom prst="rect">
             <a:avLst/>
           </a:prstGeom>
-        </p:spPr>
-        <p:txBody>
-          <a:bodyPr lIns="0" rIns="0" tIns="0" bIns="0">
+          <a:noFill/>
+          <a:ln w="0">
+            <a:noFill/>
+          </a:ln>
+        </p:spPr>
+        <p:txBody>
+          <a:bodyPr lIns="0" rIns="0" tIns="0" bIns="0" anchor="t">
             <a:normAutofit/>
           </a:bodyPr>
           <a:p>
-            <a:endParaRPr b="0" lang="en-US" sz="3200" spc="-1" strike="noStrike">
+            <a:endParaRPr b="0" lang="pt-BR" sz="3200" spc="-1" strike="noStrike">
               <a:latin typeface="Arial"/>
             </a:endParaRPr>
           </a:p>
@@ -1172,7 +1314,7 @@
             <a:spLocks noGrp="1"/>
           </p:cNvSpPr>
           <p:nvPr>
-            <p:ph type="body"/>
+            <p:ph/>
           </p:nvPr>
         </p:nvSpPr>
         <p:spPr>
@@ -1183,13 +1325,17 @@
           <a:prstGeom prst="rect">
             <a:avLst/>
           </a:prstGeom>
-        </p:spPr>
-        <p:txBody>
-          <a:bodyPr lIns="0" rIns="0" tIns="0" bIns="0">
+          <a:noFill/>
+          <a:ln w="0">
+            <a:noFill/>
+          </a:ln>
+        </p:spPr>
+        <p:txBody>
+          <a:bodyPr lIns="0" rIns="0" tIns="0" bIns="0" anchor="t">
             <a:normAutofit/>
           </a:bodyPr>
           <a:p>
-            <a:endParaRPr b="0" lang="en-US" sz="3200" spc="-1" strike="noStrike">
+            <a:endParaRPr b="0" lang="pt-BR" sz="3200" spc="-1" strike="noStrike">
               <a:latin typeface="Arial"/>
             </a:endParaRPr>
           </a:p>
@@ -1202,7 +1348,7 @@
             <a:spLocks noGrp="1"/>
           </p:cNvSpPr>
           <p:nvPr>
-            <p:ph type="body"/>
+            <p:ph/>
           </p:nvPr>
         </p:nvSpPr>
         <p:spPr>
@@ -1213,13 +1359,17 @@
           <a:prstGeom prst="rect">
             <a:avLst/>
           </a:prstGeom>
-        </p:spPr>
-        <p:txBody>
-          <a:bodyPr lIns="0" rIns="0" tIns="0" bIns="0">
+          <a:noFill/>
+          <a:ln w="0">
+            <a:noFill/>
+          </a:ln>
+        </p:spPr>
+        <p:txBody>
+          <a:bodyPr lIns="0" rIns="0" tIns="0" bIns="0" anchor="t">
             <a:normAutofit/>
           </a:bodyPr>
           <a:p>
-            <a:endParaRPr b="0" lang="en-US" sz="3200" spc="-1" strike="noStrike">
+            <a:endParaRPr b="0" lang="pt-BR" sz="3200" spc="-1" strike="noStrike">
               <a:latin typeface="Arial"/>
             </a:endParaRPr>
           </a:p>
@@ -1265,14 +1415,20 @@
           <a:prstGeom prst="rect">
             <a:avLst/>
           </a:prstGeom>
+          <a:noFill/>
+          <a:ln w="0">
+            <a:noFill/>
+          </a:ln>
         </p:spPr>
         <p:txBody>
           <a:bodyPr lIns="0" rIns="0" tIns="0" bIns="0" anchor="ctr">
             <a:noAutofit/>
           </a:bodyPr>
           <a:p>
-            <a:pPr algn="ctr"/>
-            <a:endParaRPr b="0" lang="en-US" sz="4400" spc="-1" strike="noStrike">
+            <a:pPr algn="ctr">
+              <a:buNone/>
+            </a:pPr>
+            <a:endParaRPr b="0" lang="pt-BR" sz="4400" spc="-1" strike="noStrike">
               <a:latin typeface="Arial"/>
             </a:endParaRPr>
           </a:p>
@@ -1285,7 +1441,7 @@
             <a:spLocks noGrp="1"/>
           </p:cNvSpPr>
           <p:nvPr>
-            <p:ph type="body"/>
+            <p:ph/>
           </p:nvPr>
         </p:nvSpPr>
         <p:spPr>
@@ -1296,13 +1452,17 @@
           <a:prstGeom prst="rect">
             <a:avLst/>
           </a:prstGeom>
-        </p:spPr>
-        <p:txBody>
-          <a:bodyPr lIns="0" rIns="0" tIns="0" bIns="0">
+          <a:noFill/>
+          <a:ln w="0">
+            <a:noFill/>
+          </a:ln>
+        </p:spPr>
+        <p:txBody>
+          <a:bodyPr lIns="0" rIns="0" tIns="0" bIns="0" anchor="t">
             <a:normAutofit/>
           </a:bodyPr>
           <a:p>
-            <a:endParaRPr b="0" lang="en-US" sz="3200" spc="-1" strike="noStrike">
+            <a:endParaRPr b="0" lang="pt-BR" sz="3200" spc="-1" strike="noStrike">
               <a:latin typeface="Arial"/>
             </a:endParaRPr>
           </a:p>
@@ -1315,7 +1475,7 @@
             <a:spLocks noGrp="1"/>
           </p:cNvSpPr>
           <p:nvPr>
-            <p:ph type="body"/>
+            <p:ph/>
           </p:nvPr>
         </p:nvSpPr>
         <p:spPr>
@@ -1326,13 +1486,17 @@
           <a:prstGeom prst="rect">
             <a:avLst/>
           </a:prstGeom>
-        </p:spPr>
-        <p:txBody>
-          <a:bodyPr lIns="0" rIns="0" tIns="0" bIns="0">
+          <a:noFill/>
+          <a:ln w="0">
+            <a:noFill/>
+          </a:ln>
+        </p:spPr>
+        <p:txBody>
+          <a:bodyPr lIns="0" rIns="0" tIns="0" bIns="0" anchor="t">
             <a:normAutofit/>
           </a:bodyPr>
           <a:p>
-            <a:endParaRPr b="0" lang="en-US" sz="3200" spc="-1" strike="noStrike">
+            <a:endParaRPr b="0" lang="pt-BR" sz="3200" spc="-1" strike="noStrike">
               <a:latin typeface="Arial"/>
             </a:endParaRPr>
           </a:p>
@@ -1345,7 +1509,7 @@
             <a:spLocks noGrp="1"/>
           </p:cNvSpPr>
           <p:nvPr>
-            <p:ph type="body"/>
+            <p:ph/>
           </p:nvPr>
         </p:nvSpPr>
         <p:spPr>
@@ -1356,13 +1520,17 @@
           <a:prstGeom prst="rect">
             <a:avLst/>
           </a:prstGeom>
-        </p:spPr>
-        <p:txBody>
-          <a:bodyPr lIns="0" rIns="0" tIns="0" bIns="0">
+          <a:noFill/>
+          <a:ln w="0">
+            <a:noFill/>
+          </a:ln>
+        </p:spPr>
+        <p:txBody>
+          <a:bodyPr lIns="0" rIns="0" tIns="0" bIns="0" anchor="t">
             <a:normAutofit/>
           </a:bodyPr>
           <a:p>
-            <a:endParaRPr b="0" lang="en-US" sz="3200" spc="-1" strike="noStrike">
+            <a:endParaRPr b="0" lang="pt-BR" sz="3200" spc="-1" strike="noStrike">
               <a:latin typeface="Arial"/>
             </a:endParaRPr>
           </a:p>
@@ -1415,20 +1583,26 @@
           <a:prstGeom prst="rect">
             <a:avLst/>
           </a:prstGeom>
+          <a:noFill/>
+          <a:ln w="0">
+            <a:noFill/>
+          </a:ln>
         </p:spPr>
         <p:txBody>
           <a:bodyPr lIns="0" rIns="0" tIns="0" bIns="0" anchor="ctr">
             <a:noAutofit/>
           </a:bodyPr>
           <a:p>
-            <a:pPr algn="ctr"/>
-            <a:r>
-              <a:rPr b="0" lang="ja-JP" sz="4400" spc="-1" strike="noStrike">
+            <a:pPr algn="ctr">
+              <a:buNone/>
+            </a:pPr>
+            <a:r>
+              <a:rPr b="0" lang="pt-BR" sz="4400" spc="-1" strike="noStrike">
                 <a:latin typeface="Arial"/>
               </a:rPr>
-              <a:t>タイトルテキストの書式を編集するにはクリックします。</a:t>
-            </a:r>
-            <a:endParaRPr b="0" lang="en-US" sz="4400" spc="-1" strike="noStrike">
+              <a:t>Click to edit the title text format</a:t>
+            </a:r>
+            <a:endParaRPr b="0" lang="pt-BR" sz="4400" spc="-1" strike="noStrike">
               <a:latin typeface="Arial"/>
             </a:endParaRPr>
           </a:p>
@@ -1452,9 +1626,13 @@
           <a:prstGeom prst="rect">
             <a:avLst/>
           </a:prstGeom>
-        </p:spPr>
-        <p:txBody>
-          <a:bodyPr lIns="0" rIns="0" tIns="0" bIns="0">
+          <a:noFill/>
+          <a:ln w="0">
+            <a:noFill/>
+          </a:ln>
+        </p:spPr>
+        <p:txBody>
+          <a:bodyPr lIns="0" rIns="0" tIns="0" bIns="0" anchor="t">
             <a:normAutofit/>
           </a:bodyPr>
           <a:p>
@@ -1470,12 +1648,12 @@
               <a:buChar char=""/>
             </a:pPr>
             <a:r>
-              <a:rPr b="0" lang="ja-JP" sz="3200" spc="-1" strike="noStrike">
+              <a:rPr b="0" lang="pt-BR" sz="3200" spc="-1" strike="noStrike">
                 <a:latin typeface="Arial"/>
               </a:rPr>
-              <a:t>アウトラインテキストの書式を編集するにはクリックします。</a:t>
-            </a:r>
-            <a:endParaRPr b="0" lang="en-US" sz="3200" spc="-1" strike="noStrike">
+              <a:t>Click to edit the outline text format</a:t>
+            </a:r>
+            <a:endParaRPr b="0" lang="pt-BR" sz="3200" spc="-1" strike="noStrike">
               <a:latin typeface="Arial"/>
             </a:endParaRPr>
           </a:p>
@@ -1492,18 +1670,12 @@
               <a:buChar char=""/>
             </a:pPr>
             <a:r>
-              <a:rPr b="0" lang="en-US" sz="2800" spc="-1" strike="noStrike">
+              <a:rPr b="0" lang="pt-BR" sz="2800" spc="-1" strike="noStrike">
                 <a:latin typeface="Arial"/>
               </a:rPr>
-              <a:t>2</a:t>
-            </a:r>
-            <a:r>
-              <a:rPr b="0" lang="ja-JP" sz="2800" spc="-1" strike="noStrike">
-                <a:latin typeface="Arial"/>
-              </a:rPr>
-              <a:t>レベル目のアウトライン</a:t>
-            </a:r>
-            <a:endParaRPr b="0" lang="en-US" sz="2800" spc="-1" strike="noStrike">
+              <a:t>Second Outline Level</a:t>
+            </a:r>
+            <a:endParaRPr b="0" lang="pt-BR" sz="2800" spc="-1" strike="noStrike">
               <a:latin typeface="Arial"/>
             </a:endParaRPr>
           </a:p>
@@ -1520,18 +1692,12 @@
               <a:buChar char=""/>
             </a:pPr>
             <a:r>
-              <a:rPr b="0" lang="en-US" sz="2400" spc="-1" strike="noStrike">
+              <a:rPr b="0" lang="pt-BR" sz="2400" spc="-1" strike="noStrike">
                 <a:latin typeface="Arial"/>
               </a:rPr>
-              <a:t>3</a:t>
-            </a:r>
-            <a:r>
-              <a:rPr b="0" lang="ja-JP" sz="2400" spc="-1" strike="noStrike">
-                <a:latin typeface="Arial"/>
-              </a:rPr>
-              <a:t>レベル目のアウトライン</a:t>
-            </a:r>
-            <a:endParaRPr b="0" lang="en-US" sz="2400" spc="-1" strike="noStrike">
+              <a:t>Third Outline Level</a:t>
+            </a:r>
+            <a:endParaRPr b="0" lang="pt-BR" sz="2400" spc="-1" strike="noStrike">
               <a:latin typeface="Arial"/>
             </a:endParaRPr>
           </a:p>
@@ -1548,18 +1714,12 @@
               <a:buChar char=""/>
             </a:pPr>
             <a:r>
-              <a:rPr b="0" lang="en-US" sz="2000" spc="-1" strike="noStrike">
+              <a:rPr b="0" lang="pt-BR" sz="2000" spc="-1" strike="noStrike">
                 <a:latin typeface="Arial"/>
               </a:rPr>
-              <a:t>4</a:t>
-            </a:r>
-            <a:r>
-              <a:rPr b="0" lang="ja-JP" sz="2000" spc="-1" strike="noStrike">
-                <a:latin typeface="Arial"/>
-              </a:rPr>
-              <a:t>レベル目のアウトライン</a:t>
-            </a:r>
-            <a:endParaRPr b="0" lang="en-US" sz="2000" spc="-1" strike="noStrike">
+              <a:t>Fourth Outline Level</a:t>
+            </a:r>
+            <a:endParaRPr b="0" lang="pt-BR" sz="2000" spc="-1" strike="noStrike">
               <a:latin typeface="Arial"/>
             </a:endParaRPr>
           </a:p>
@@ -1576,18 +1736,12 @@
               <a:buChar char=""/>
             </a:pPr>
             <a:r>
-              <a:rPr b="0" lang="en-US" sz="2000" spc="-1" strike="noStrike">
+              <a:rPr b="0" lang="pt-BR" sz="2000" spc="-1" strike="noStrike">
                 <a:latin typeface="Arial"/>
               </a:rPr>
-              <a:t>5</a:t>
-            </a:r>
-            <a:r>
-              <a:rPr b="0" lang="ja-JP" sz="2000" spc="-1" strike="noStrike">
-                <a:latin typeface="Arial"/>
-              </a:rPr>
-              <a:t>レベル目のアウトライン</a:t>
-            </a:r>
-            <a:endParaRPr b="0" lang="en-US" sz="2000" spc="-1" strike="noStrike">
+              <a:t>Fifth Outline Level</a:t>
+            </a:r>
+            <a:endParaRPr b="0" lang="pt-BR" sz="2000" spc="-1" strike="noStrike">
               <a:latin typeface="Arial"/>
             </a:endParaRPr>
           </a:p>
@@ -1604,18 +1758,12 @@
               <a:buChar char=""/>
             </a:pPr>
             <a:r>
-              <a:rPr b="0" lang="en-US" sz="2000" spc="-1" strike="noStrike">
+              <a:rPr b="0" lang="pt-BR" sz="2000" spc="-1" strike="noStrike">
                 <a:latin typeface="Arial"/>
               </a:rPr>
-              <a:t>6</a:t>
-            </a:r>
-            <a:r>
-              <a:rPr b="0" lang="ja-JP" sz="2000" spc="-1" strike="noStrike">
-                <a:latin typeface="Arial"/>
-              </a:rPr>
-              <a:t>レベル目のアウトライン</a:t>
-            </a:r>
-            <a:endParaRPr b="0" lang="en-US" sz="2000" spc="-1" strike="noStrike">
+              <a:t>Sixth Outline Level</a:t>
+            </a:r>
+            <a:endParaRPr b="0" lang="pt-BR" sz="2000" spc="-1" strike="noStrike">
               <a:latin typeface="Arial"/>
             </a:endParaRPr>
           </a:p>
@@ -1632,18 +1780,12 @@
               <a:buChar char=""/>
             </a:pPr>
             <a:r>
-              <a:rPr b="0" lang="en-US" sz="2000" spc="-1" strike="noStrike">
+              <a:rPr b="0" lang="pt-BR" sz="2000" spc="-1" strike="noStrike">
                 <a:latin typeface="Arial"/>
               </a:rPr>
-              <a:t>7</a:t>
-            </a:r>
-            <a:r>
-              <a:rPr b="0" lang="ja-JP" sz="2000" spc="-1" strike="noStrike">
-                <a:latin typeface="Arial"/>
-              </a:rPr>
-              <a:t>レベル目のアウトライン</a:t>
-            </a:r>
-            <a:endParaRPr b="0" lang="en-US" sz="2000" spc="-1" strike="noStrike">
+              <a:t>Seventh Outline Level</a:t>
+            </a:r>
+            <a:endParaRPr b="0" lang="pt-BR" sz="2000" spc="-1" strike="noStrike">
               <a:latin typeface="Arial"/>
             </a:endParaRPr>
           </a:p>
@@ -1688,14 +1830,14 @@
       </p:grpSpPr>
       <p:sp>
         <p:nvSpPr>
-          <p:cNvPr id="38" name="CustomShape 1"/>
+          <p:cNvPr id="38" name=""/>
           <p:cNvSpPr/>
           <p:nvPr/>
         </p:nvSpPr>
         <p:spPr>
           <a:xfrm>
-            <a:off x="1523880" y="428760"/>
-            <a:ext cx="9142560" cy="884520"/>
+            <a:off x="1440000" y="720000"/>
+            <a:ext cx="9718560" cy="5693040"/>
           </a:xfrm>
           <a:prstGeom prst="rect">
             <a:avLst/>
@@ -1712,94 +1854,19 @@
           <a:fontRef idx="minor"/>
         </p:style>
         <p:txBody>
-          <a:bodyPr lIns="90000" rIns="90000" tIns="45000" bIns="45000" anchor="b">
-            <a:normAutofit fontScale="85000"/>
-          </a:bodyPr>
-          <a:p>
-            <a:pPr algn="ctr">
-              <a:lnSpc>
-                <a:spcPct val="90000"/>
-              </a:lnSpc>
-            </a:pPr>
-            <a:r>
-              <a:rPr b="0" lang="en-US" sz="6000" spc="-1" strike="noStrike">
-                <a:solidFill>
-                  <a:srgbClr val="000000"/>
-                </a:solidFill>
-                <a:latin typeface="Meiryo UI"/>
-                <a:ea typeface="Meiryo UI"/>
-              </a:rPr>
-              <a:t>BBB</a:t>
-            </a:r>
-            <a:r>
-              <a:rPr b="0" lang="ja-JP" sz="6000" spc="-1" strike="noStrike">
-                <a:solidFill>
-                  <a:srgbClr val="000000"/>
-                </a:solidFill>
-                <a:latin typeface="Meiryo UI"/>
-                <a:ea typeface="Meiryo UI"/>
-              </a:rPr>
-              <a:t>サンプルスライド</a:t>
-            </a:r>
-            <a:endParaRPr b="0" lang="en-US" sz="6000" spc="-1" strike="noStrike">
-              <a:latin typeface="Arial"/>
-            </a:endParaRPr>
-          </a:p>
-        </p:txBody>
-      </p:sp>
-      <p:sp>
-        <p:nvSpPr>
-          <p:cNvPr id="39" name="CustomShape 2"/>
-          <p:cNvSpPr/>
-          <p:nvPr/>
-        </p:nvSpPr>
-        <p:spPr>
-          <a:xfrm>
-            <a:off x="1523880" y="1314360"/>
-            <a:ext cx="9142560" cy="5113440"/>
-          </a:xfrm>
-          <a:prstGeom prst="rect">
-            <a:avLst/>
-          </a:prstGeom>
-          <a:noFill/>
-          <a:ln w="0">
-            <a:noFill/>
-          </a:ln>
-        </p:spPr>
-        <p:style>
-          <a:lnRef idx="0"/>
-          <a:fillRef idx="0"/>
-          <a:effectRef idx="0"/>
-          <a:fontRef idx="minor"/>
-        </p:style>
-        <p:txBody>
-          <a:bodyPr lIns="90000" rIns="90000" tIns="45000" bIns="45000">
+          <a:bodyPr lIns="90000" rIns="90000" tIns="45000" bIns="45000" anchor="t">
             <a:noAutofit/>
           </a:bodyPr>
           <a:p>
-            <a:pPr marL="343080" indent="-341640">
-              <a:lnSpc>
-                <a:spcPct val="90000"/>
-              </a:lnSpc>
-              <a:spcBef>
-                <a:spcPts val="1001"/>
-              </a:spcBef>
-              <a:buClr>
-                <a:srgbClr val="000000"/>
-              </a:buClr>
-              <a:buFont typeface="Arial"/>
-              <a:buChar char="•"/>
-            </a:pPr>
-            <a:r>
-              <a:rPr b="0" lang="en-US" sz="2400" spc="-1" strike="noStrike">
-                <a:solidFill>
-                  <a:srgbClr val="000000"/>
-                </a:solidFill>
-                <a:latin typeface="Meiryo UI"/>
-                <a:ea typeface="Meiryo UI"/>
-              </a:rPr>
-              <a:t>BBB</a:t>
-            </a:r>
+            <a:pPr>
+              <a:lnSpc>
+                <a:spcPct val="90000"/>
+              </a:lnSpc>
+              <a:spcBef>
+                <a:spcPts val="1001"/>
+              </a:spcBef>
+              <a:buNone/>
+            </a:pPr>
             <a:r>
               <a:rPr b="0" lang="ja-JP" sz="2400" spc="-1" strike="noStrike">
                 <a:solidFill>
@@ -1808,353 +1875,9 @@
                 <a:latin typeface="Meiryo UI"/>
                 <a:ea typeface="Meiryo UI"/>
               </a:rPr>
-              <a:t>ではパワポファイルをそのままアップロード可能だが、</a:t>
-            </a:r>
-            <a:r>
-              <a:rPr b="0" lang="ja-JP" sz="2400" spc="-1" strike="noStrike">
-                <a:solidFill>
-                  <a:srgbClr val="ff0000"/>
-                </a:solidFill>
-                <a:latin typeface="Meiryo UI"/>
-                <a:ea typeface="Meiryo UI"/>
-              </a:rPr>
-              <a:t>アニメーションと埋め込み動画が動かない</a:t>
-            </a:r>
-            <a:endParaRPr b="0" lang="en-US" sz="2400" spc="-1" strike="noStrike">
-              <a:latin typeface="Arial"/>
-            </a:endParaRPr>
-          </a:p>
-          <a:p>
-            <a:pPr marL="343080" indent="-341640">
-              <a:lnSpc>
-                <a:spcPct val="90000"/>
-              </a:lnSpc>
-              <a:spcBef>
-                <a:spcPts val="1001"/>
-              </a:spcBef>
-              <a:buClr>
-                <a:srgbClr val="000000"/>
-              </a:buClr>
-              <a:buFont typeface="Arial"/>
-              <a:buChar char="•"/>
-            </a:pPr>
-            <a:r>
-              <a:rPr b="0" lang="ja-JP" sz="2400" spc="-1" strike="noStrike">
-                <a:solidFill>
-                  <a:srgbClr val="000000"/>
-                </a:solidFill>
-                <a:latin typeface="Meiryo UI"/>
-                <a:ea typeface="Meiryo UI"/>
-              </a:rPr>
-              <a:t>もちろん</a:t>
-            </a:r>
-            <a:r>
-              <a:rPr b="0" lang="ja-JP" sz="2400" spc="-1" strike="noStrike">
-                <a:solidFill>
-                  <a:srgbClr val="ff0000"/>
-                </a:solidFill>
-                <a:latin typeface="Meiryo UI"/>
-                <a:ea typeface="Meiryo UI"/>
-              </a:rPr>
-              <a:t>スクリーンシェア機能</a:t>
-            </a:r>
-            <a:r>
-              <a:rPr b="0" lang="ja-JP" sz="2400" spc="-1" strike="noStrike">
-                <a:solidFill>
-                  <a:srgbClr val="000000"/>
-                </a:solidFill>
-                <a:latin typeface="Meiryo UI"/>
-                <a:ea typeface="Meiryo UI"/>
-              </a:rPr>
-              <a:t>を使用すれば</a:t>
-            </a:r>
-            <a:r>
-              <a:rPr b="0" lang="en-US" sz="2400" spc="-1" strike="noStrike">
-                <a:solidFill>
-                  <a:srgbClr val="000000"/>
-                </a:solidFill>
-                <a:latin typeface="Meiryo UI"/>
-                <a:ea typeface="Meiryo UI"/>
-              </a:rPr>
-              <a:t>Zoom</a:t>
-            </a:r>
-            <a:r>
-              <a:rPr b="0" lang="ja-JP" sz="2400" spc="-1" strike="noStrike">
-                <a:solidFill>
-                  <a:srgbClr val="000000"/>
-                </a:solidFill>
-                <a:latin typeface="Meiryo UI"/>
-                <a:ea typeface="Meiryo UI"/>
-              </a:rPr>
-              <a:t>や</a:t>
-            </a:r>
-            <a:r>
-              <a:rPr b="0" lang="en-US" sz="2400" spc="-1" strike="noStrike">
-                <a:solidFill>
-                  <a:srgbClr val="000000"/>
-                </a:solidFill>
-                <a:latin typeface="Meiryo UI"/>
-                <a:ea typeface="Meiryo UI"/>
-              </a:rPr>
-              <a:t>Teams</a:t>
-            </a:r>
-            <a:r>
-              <a:rPr b="0" lang="ja-JP" sz="2400" spc="-1" strike="noStrike">
-                <a:solidFill>
-                  <a:srgbClr val="000000"/>
-                </a:solidFill>
-                <a:latin typeface="Meiryo UI"/>
-                <a:ea typeface="Meiryo UI"/>
-              </a:rPr>
-              <a:t>と同様にパワポのウィンドウに映ったものをそのまま学生に配信することができるが、画質音質の点で</a:t>
-            </a:r>
-            <a:r>
-              <a:rPr b="0" lang="en-US" sz="2400" spc="-1" strike="noStrike">
-                <a:solidFill>
-                  <a:srgbClr val="000000"/>
-                </a:solidFill>
-                <a:latin typeface="Meiryo UI"/>
-                <a:ea typeface="Meiryo UI"/>
-              </a:rPr>
-              <a:t>Zoom</a:t>
-            </a:r>
-            <a:r>
-              <a:rPr b="0" lang="ja-JP" sz="2400" spc="-1" strike="noStrike">
-                <a:solidFill>
-                  <a:srgbClr val="000000"/>
-                </a:solidFill>
-                <a:latin typeface="Meiryo UI"/>
-                <a:ea typeface="Meiryo UI"/>
-              </a:rPr>
-              <a:t>にはかなわないし、通信量の低さという</a:t>
-            </a:r>
-            <a:r>
-              <a:rPr b="0" lang="en-US" sz="2400" spc="-1" strike="noStrike">
-                <a:solidFill>
-                  <a:srgbClr val="000000"/>
-                </a:solidFill>
-                <a:latin typeface="Meiryo UI"/>
-                <a:ea typeface="Meiryo UI"/>
-              </a:rPr>
-              <a:t>BBB</a:t>
-            </a:r>
-            <a:r>
-              <a:rPr b="0" lang="ja-JP" sz="2400" spc="-1" strike="noStrike">
-                <a:solidFill>
-                  <a:srgbClr val="000000"/>
-                </a:solidFill>
-                <a:latin typeface="Meiryo UI"/>
-                <a:ea typeface="Meiryo UI"/>
-              </a:rPr>
-              <a:t>の利点が失われてしまう</a:t>
-            </a:r>
-            <a:endParaRPr b="0" lang="en-US" sz="2400" spc="-1" strike="noStrike">
-              <a:latin typeface="Arial"/>
-            </a:endParaRPr>
-          </a:p>
-          <a:p>
-            <a:pPr marL="343080" indent="-341640">
-              <a:lnSpc>
-                <a:spcPct val="90000"/>
-              </a:lnSpc>
-              <a:spcBef>
-                <a:spcPts val="1001"/>
-              </a:spcBef>
-              <a:buClr>
-                <a:srgbClr val="000000"/>
-              </a:buClr>
-              <a:buFont typeface="Arial"/>
-              <a:buChar char="•"/>
-            </a:pPr>
-            <a:r>
-              <a:rPr b="0" lang="ja-JP" sz="2400" spc="-1" strike="noStrike">
-                <a:solidFill>
-                  <a:srgbClr val="000000"/>
-                </a:solidFill>
-                <a:latin typeface="Meiryo UI"/>
-                <a:ea typeface="Meiryo UI"/>
-              </a:rPr>
-              <a:t>おすすめの方法：通常のパワポファイル → 凝ったエフェクトアニメーションは削除し、更に</a:t>
-            </a:r>
-            <a:r>
-              <a:rPr b="0" lang="en-US" sz="2400" spc="-1" strike="noStrike">
-                <a:solidFill>
-                  <a:srgbClr val="ff0000"/>
-                </a:solidFill>
-                <a:latin typeface="Meiryo UI"/>
-                <a:ea typeface="Meiryo UI"/>
-              </a:rPr>
-              <a:t>PPspliT</a:t>
-            </a:r>
-            <a:r>
-              <a:rPr b="0" lang="ja-JP" sz="2400" spc="-1" strike="noStrike">
-                <a:solidFill>
-                  <a:srgbClr val="000000"/>
-                </a:solidFill>
-                <a:latin typeface="Meiryo UI"/>
-                <a:ea typeface="Meiryo UI"/>
-              </a:rPr>
-              <a:t>などを使用して単純な表示、消去アニメーション部分を複数のスライドに分割 → 埋め込みムービーはそのまま放っておき、必要なものは</a:t>
-            </a:r>
-            <a:r>
-              <a:rPr b="0" lang="en-US" sz="2400" spc="-1" strike="noStrike">
-                <a:solidFill>
-                  <a:srgbClr val="ff0000"/>
-                </a:solidFill>
-                <a:latin typeface="Meiryo UI"/>
-                <a:ea typeface="Meiryo UI"/>
-              </a:rPr>
-              <a:t>YouTube</a:t>
-            </a:r>
-            <a:r>
-              <a:rPr b="0" lang="ja-JP" sz="2400" spc="-1" strike="noStrike">
-                <a:solidFill>
-                  <a:srgbClr val="ff0000"/>
-                </a:solidFill>
-                <a:latin typeface="Meiryo UI"/>
-                <a:ea typeface="Meiryo UI"/>
-              </a:rPr>
-              <a:t>にアップロード</a:t>
-            </a:r>
-            <a:r>
-              <a:rPr b="0" lang="ja-JP" sz="2400" spc="-1" strike="noStrike">
-                <a:solidFill>
-                  <a:srgbClr val="000000"/>
-                </a:solidFill>
-                <a:latin typeface="Meiryo UI"/>
-                <a:ea typeface="Meiryo UI"/>
-              </a:rPr>
-              <a:t>、その</a:t>
-            </a:r>
-            <a:r>
-              <a:rPr b="0" lang="en-US" sz="2400" spc="-1" strike="noStrike">
-                <a:solidFill>
-                  <a:srgbClr val="000000"/>
-                </a:solidFill>
-                <a:latin typeface="Meiryo UI"/>
-                <a:ea typeface="Meiryo UI"/>
-              </a:rPr>
-              <a:t>URL</a:t>
-            </a:r>
-            <a:r>
-              <a:rPr b="0" lang="ja-JP" sz="2400" spc="-1" strike="noStrike">
-                <a:solidFill>
-                  <a:srgbClr val="000000"/>
-                </a:solidFill>
-                <a:latin typeface="Meiryo UI"/>
-                <a:ea typeface="Meiryo UI"/>
-              </a:rPr>
-              <a:t>をパワポファイルに小さく書いておく → </a:t>
-            </a:r>
-            <a:r>
-              <a:rPr b="0" lang="en-US" sz="2400" spc="-1" strike="noStrike">
-                <a:solidFill>
-                  <a:srgbClr val="000000"/>
-                </a:solidFill>
-                <a:latin typeface="Meiryo UI"/>
-                <a:ea typeface="Meiryo UI"/>
-              </a:rPr>
-              <a:t>PDF</a:t>
-            </a:r>
-            <a:r>
-              <a:rPr b="0" lang="ja-JP" sz="2400" spc="-1" strike="noStrike">
-                <a:solidFill>
-                  <a:srgbClr val="000000"/>
-                </a:solidFill>
-                <a:latin typeface="Meiryo UI"/>
-                <a:ea typeface="Meiryo UI"/>
-              </a:rPr>
-              <a:t>にエクスポート → これを</a:t>
-            </a:r>
-            <a:r>
-              <a:rPr b="0" lang="en-US" sz="2400" spc="-1" strike="noStrike">
-                <a:solidFill>
-                  <a:srgbClr val="000000"/>
-                </a:solidFill>
-                <a:latin typeface="Meiryo UI"/>
-                <a:ea typeface="Meiryo UI"/>
-              </a:rPr>
-              <a:t>BBB</a:t>
-            </a:r>
-            <a:r>
-              <a:rPr b="0" lang="ja-JP" sz="2400" spc="-1" strike="noStrike">
-                <a:solidFill>
-                  <a:srgbClr val="000000"/>
-                </a:solidFill>
-                <a:latin typeface="Meiryo UI"/>
-                <a:ea typeface="Meiryo UI"/>
-              </a:rPr>
-              <a:t>にアップロード</a:t>
-            </a:r>
-            <a:endParaRPr b="0" lang="en-US" sz="2400" spc="-1" strike="noStrike">
-              <a:latin typeface="Arial"/>
-            </a:endParaRPr>
-          </a:p>
-          <a:p>
-            <a:pPr marL="343080" indent="-341640">
-              <a:lnSpc>
-                <a:spcPct val="90000"/>
-              </a:lnSpc>
-              <a:spcBef>
-                <a:spcPts val="1001"/>
-              </a:spcBef>
-              <a:buClr>
-                <a:srgbClr val="000000"/>
-              </a:buClr>
-              <a:buFont typeface="Arial"/>
-              <a:buChar char="•"/>
-            </a:pPr>
-            <a:r>
-              <a:rPr b="0" lang="ja-JP" sz="2400" spc="-1" strike="noStrike">
-                <a:solidFill>
-                  <a:srgbClr val="000000"/>
-                </a:solidFill>
-                <a:latin typeface="Meiryo UI"/>
-                <a:ea typeface="Meiryo UI"/>
-              </a:rPr>
-              <a:t>埋め込み動画のスライドに来ると、自動的に</a:t>
-            </a:r>
-            <a:r>
-              <a:rPr b="0" lang="en-US" sz="2400" spc="-1" strike="noStrike">
-                <a:solidFill>
-                  <a:srgbClr val="000000"/>
-                </a:solidFill>
-                <a:latin typeface="Meiryo UI"/>
-                <a:ea typeface="Meiryo UI"/>
-              </a:rPr>
-              <a:t>YouTube</a:t>
-            </a:r>
-            <a:r>
-              <a:rPr b="0" lang="ja-JP" sz="2400" spc="-1" strike="noStrike">
-                <a:solidFill>
-                  <a:srgbClr val="000000"/>
-                </a:solidFill>
-                <a:latin typeface="Meiryo UI"/>
-                <a:ea typeface="Meiryo UI"/>
-              </a:rPr>
-              <a:t>へのリンクが現れる。学生側では</a:t>
-            </a:r>
-            <a:r>
-              <a:rPr b="0" lang="en-US" sz="2400" spc="-1" strike="noStrike">
-                <a:solidFill>
-                  <a:srgbClr val="000000"/>
-                </a:solidFill>
-                <a:latin typeface="Meiryo UI"/>
-                <a:ea typeface="Meiryo UI"/>
-              </a:rPr>
-              <a:t>YouTube</a:t>
-            </a:r>
-            <a:r>
-              <a:rPr b="0" lang="ja-JP" sz="2400" spc="-1" strike="noStrike">
-                <a:solidFill>
-                  <a:srgbClr val="000000"/>
-                </a:solidFill>
-                <a:latin typeface="Meiryo UI"/>
-                <a:ea typeface="Meiryo UI"/>
-              </a:rPr>
-              <a:t>に直接接続するので画質よく滑らかに再生できる</a:t>
-            </a:r>
-            <a:endParaRPr b="0" lang="en-US" sz="2400" spc="-1" strike="noStrike">
+              <a:t>ではパワポファイルをそのままアップロード可能だが、もちろんを使用すればやと同様にパワポのウィンドウに映ったものをそのまま学生に配信することができるが、画質音質の点でにはかなわないし、通信量の低さというの利点が失われてしまうおすすめの方法：通常のパワポファイル → 凝ったエフェクトアニメーションは削除し、更になどを使用して単純な表示、消去アニメーション部分を複数のスライドに分割 → 埋め込みムービーはそのまま放っておき、必要なものは、そのをパワポファイルに小さく書いておく → にエクスポート → これをにアップロード埋め込み動画のスライドに来ると、自動的にへのリンクが現れる。学生側ではに直接接続するので画質よく滑らかに再生できる</a:t>
+            </a:r>
+            <a:endParaRPr b="0" lang="pt-BR" sz="2400" spc="-1" strike="noStrike">
               <a:latin typeface="Arial"/>
             </a:endParaRPr>
           </a:p>
@@ -2166,8 +1889,9 @@
               <a:spcBef>
                 <a:spcPts val="1001"/>
               </a:spcBef>
-            </a:pPr>
-            <a:endParaRPr b="0" lang="en-US" sz="2400" spc="-1" strike="noStrike">
+              <a:buNone/>
+            </a:pPr>
+            <a:endParaRPr b="0" lang="pt-BR" sz="2400" spc="-1" strike="noStrike">
               <a:latin typeface="Arial"/>
             </a:endParaRPr>
           </a:p>
@@ -2205,14 +1929,14 @@
       </p:grpSpPr>
       <p:sp>
         <p:nvSpPr>
-          <p:cNvPr id="40" name="CustomShape 1"/>
+          <p:cNvPr id="39" name="CustomShape 1"/>
           <p:cNvSpPr/>
           <p:nvPr/>
         </p:nvSpPr>
         <p:spPr>
           <a:xfrm>
             <a:off x="1523880" y="646200"/>
-            <a:ext cx="9142560" cy="1757880"/>
+            <a:ext cx="9140760" cy="1756080"/>
           </a:xfrm>
           <a:prstGeom prst="rect">
             <a:avLst/>
@@ -2230,7 +1954,7 @@
         </p:style>
         <p:txBody>
           <a:bodyPr lIns="90000" rIns="90000" tIns="45000" bIns="45000" anchor="b">
-            <a:normAutofit fontScale="97000"/>
+            <a:normAutofit/>
           </a:bodyPr>
           <a:p>
             <a:pPr algn="ctr">
@@ -2240,6 +1964,7 @@
               <a:spcBef>
                 <a:spcPts val="1001"/>
               </a:spcBef>
+              <a:buNone/>
             </a:pPr>
             <a:r>
               <a:rPr b="0" lang="ja-JP" sz="6000" spc="-1" strike="noStrike">
@@ -2251,7 +1976,9 @@
               </a:rPr>
               <a:t>結構使える簡易投票機能</a:t>
             </a:r>
-            <a:br/>
+            <a:br>
+              <a:rPr sz="1800"/>
+            </a:br>
             <a:r>
               <a:rPr b="0" lang="ja-JP" sz="2800" spc="-1" strike="noStrike">
                 <a:solidFill>
@@ -2302,23 +2029,25 @@
               </a:rPr>
               <a:t>では不可）</a:t>
             </a:r>
-            <a:br/>
-            <a:endParaRPr b="0" lang="en-US" sz="2800" spc="-1" strike="noStrike">
-              <a:latin typeface="Arial"/>
-            </a:endParaRPr>
-          </a:p>
-        </p:txBody>
-      </p:sp>
-      <p:sp>
-        <p:nvSpPr>
-          <p:cNvPr id="41" name="CustomShape 2"/>
+            <a:br>
+              <a:rPr sz="2800"/>
+            </a:br>
+            <a:endParaRPr b="0" lang="pt-BR" sz="2800" spc="-1" strike="noStrike">
+              <a:latin typeface="Arial"/>
+            </a:endParaRPr>
+          </a:p>
+        </p:txBody>
+      </p:sp>
+      <p:sp>
+        <p:nvSpPr>
+          <p:cNvPr id="40" name="CustomShape 2"/>
           <p:cNvSpPr/>
           <p:nvPr/>
         </p:nvSpPr>
         <p:spPr>
           <a:xfrm>
             <a:off x="718560" y="1981080"/>
-            <a:ext cx="10666440" cy="4588200"/>
+            <a:ext cx="10664640" cy="4586400"/>
           </a:xfrm>
           <a:prstGeom prst="rect">
             <a:avLst/>
@@ -2335,7 +2064,7 @@
           <a:fontRef idx="minor"/>
         </p:style>
         <p:txBody>
-          <a:bodyPr lIns="90000" rIns="90000" tIns="45000" bIns="45000">
+          <a:bodyPr lIns="90000" rIns="90000" tIns="45000" bIns="45000" anchor="t">
             <a:normAutofit/>
           </a:bodyPr>
           <a:p>
@@ -2422,7 +2151,7 @@
               </a:rPr>
               <a:t>を自動的に読み取る。</a:t>
             </a:r>
-            <a:endParaRPr b="0" lang="en-US" sz="2800" spc="-1" strike="noStrike">
+            <a:endParaRPr b="0" lang="pt-BR" sz="2800" spc="-1" strike="noStrike">
               <a:latin typeface="Arial"/>
             </a:endParaRPr>
           </a:p>
@@ -2470,7 +2199,7 @@
               </a:rPr>
               <a:t>号機では可能）。</a:t>
             </a:r>
-            <a:endParaRPr b="0" lang="en-US" sz="2800" spc="-1" strike="noStrike">
+            <a:endParaRPr b="0" lang="pt-BR" sz="2800" spc="-1" strike="noStrike">
               <a:latin typeface="Arial"/>
             </a:endParaRPr>
           </a:p>
@@ -2482,8 +2211,9 @@
               <a:spcBef>
                 <a:spcPts val="1001"/>
               </a:spcBef>
-            </a:pPr>
-            <a:endParaRPr b="0" lang="en-US" sz="2800" spc="-1" strike="noStrike">
+              <a:buNone/>
+            </a:pPr>
+            <a:endParaRPr b="0" lang="pt-BR" sz="2800" spc="-1" strike="noStrike">
               <a:latin typeface="Arial"/>
             </a:endParaRPr>
           </a:p>
@@ -2495,6 +2225,7 @@
               <a:spcBef>
                 <a:spcPts val="1001"/>
               </a:spcBef>
+              <a:buNone/>
             </a:pPr>
             <a:r>
               <a:rPr b="0" lang="ja-JP" sz="2800" spc="-1" strike="noStrike">
@@ -2506,7 +2237,7 @@
               </a:rPr>
               <a:t>質問例：庄原は田舎か？</a:t>
             </a:r>
-            <a:endParaRPr b="0" lang="en-US" sz="2800" spc="-1" strike="noStrike">
+            <a:endParaRPr b="0" lang="pt-BR" sz="2800" spc="-1" strike="noStrike">
               <a:latin typeface="Arial"/>
             </a:endParaRPr>
           </a:p>
@@ -2534,7 +2265,7 @@
               </a:rPr>
               <a:t>はい</a:t>
             </a:r>
-            <a:endParaRPr b="0" lang="en-US" sz="2800" spc="-1" strike="noStrike">
+            <a:endParaRPr b="0" lang="pt-BR" sz="2800" spc="-1" strike="noStrike">
               <a:latin typeface="Arial"/>
             </a:endParaRPr>
           </a:p>
@@ -2562,7 +2293,7 @@
               </a:rPr>
               <a:t>いいえ</a:t>
             </a:r>
-            <a:endParaRPr b="0" lang="en-US" sz="2800" spc="-1" strike="noStrike">
+            <a:endParaRPr b="0" lang="pt-BR" sz="2800" spc="-1" strike="noStrike">
               <a:latin typeface="Arial"/>
             </a:endParaRPr>
           </a:p>
@@ -2590,7 +2321,7 @@
               </a:rPr>
               <a:t>どちらでもない</a:t>
             </a:r>
-            <a:endParaRPr b="0" lang="en-US" sz="2800" spc="-1" strike="noStrike">
+            <a:endParaRPr b="0" lang="pt-BR" sz="2800" spc="-1" strike="noStrike">
               <a:latin typeface="Arial"/>
             </a:endParaRPr>
           </a:p>
@@ -2628,14 +2359,14 @@
       </p:grpSpPr>
       <p:sp>
         <p:nvSpPr>
-          <p:cNvPr id="42" name="CustomShape 1"/>
+          <p:cNvPr id="41" name="CustomShape 1"/>
           <p:cNvSpPr/>
           <p:nvPr/>
         </p:nvSpPr>
         <p:spPr>
           <a:xfrm>
             <a:off x="1235520" y="504720"/>
-            <a:ext cx="9719640" cy="1757880"/>
+            <a:ext cx="9717840" cy="1756080"/>
           </a:xfrm>
           <a:prstGeom prst="rect">
             <a:avLst/>
@@ -2653,7 +2384,7 @@
         </p:style>
         <p:txBody>
           <a:bodyPr lIns="90000" rIns="90000" tIns="45000" bIns="45000" anchor="b">
-            <a:normAutofit fontScale="49000"/>
+            <a:normAutofit fontScale="79000"/>
           </a:bodyPr>
           <a:p>
             <a:pPr algn="ctr">
@@ -2663,6 +2394,7 @@
               <a:spcBef>
                 <a:spcPts val="1001"/>
               </a:spcBef>
+              <a:buNone/>
             </a:pPr>
             <a:r>
               <a:rPr b="0" lang="ja-JP" sz="4900" spc="-1" strike="noStrike">
@@ -2694,7 +2426,9 @@
               </a:rPr>
               <a:t>共有機能</a:t>
             </a:r>
-            <a:br/>
+            <a:br>
+              <a:rPr sz="1800"/>
+            </a:br>
             <a:r>
               <a:rPr b="0" lang="ja-JP" sz="2800" spc="-1" strike="noStrike">
                 <a:solidFill>
@@ -2745,23 +2479,25 @@
               </a:rPr>
               <a:t>では不可。画面共有でなら可能だが画質が悪い）</a:t>
             </a:r>
-            <a:br/>
-            <a:endParaRPr b="0" lang="en-US" sz="2800" spc="-1" strike="noStrike">
-              <a:latin typeface="Arial"/>
-            </a:endParaRPr>
-          </a:p>
-        </p:txBody>
-      </p:sp>
-      <p:sp>
-        <p:nvSpPr>
-          <p:cNvPr id="43" name="CustomShape 2"/>
+            <a:br>
+              <a:rPr sz="2800"/>
+            </a:br>
+            <a:endParaRPr b="0" lang="pt-BR" sz="2800" spc="-1" strike="noStrike">
+              <a:latin typeface="Arial"/>
+            </a:endParaRPr>
+          </a:p>
+        </p:txBody>
+      </p:sp>
+      <p:sp>
+        <p:nvSpPr>
+          <p:cNvPr id="42" name="CustomShape 2"/>
           <p:cNvSpPr/>
           <p:nvPr/>
         </p:nvSpPr>
         <p:spPr>
           <a:xfrm>
             <a:off x="413640" y="2057400"/>
-            <a:ext cx="11319840" cy="4588200"/>
+            <a:ext cx="11318040" cy="4586400"/>
           </a:xfrm>
           <a:prstGeom prst="rect">
             <a:avLst/>
@@ -2778,7 +2514,7 @@
           <a:fontRef idx="minor"/>
         </p:style>
         <p:txBody>
-          <a:bodyPr lIns="90000" rIns="90000" tIns="45000" bIns="45000">
+          <a:bodyPr lIns="90000" rIns="90000" tIns="45000" bIns="45000" anchor="t">
             <a:normAutofit/>
           </a:bodyPr>
           <a:p>
@@ -2789,8 +2525,9 @@
               <a:spcBef>
                 <a:spcPts val="1001"/>
               </a:spcBef>
-            </a:pPr>
-            <a:endParaRPr b="0" lang="en-US" sz="1800" spc="-1" strike="noStrike">
+              <a:buNone/>
+            </a:pPr>
+            <a:endParaRPr b="0" lang="pt-BR" sz="1800" spc="-1" strike="noStrike">
               <a:latin typeface="Arial"/>
             </a:endParaRPr>
           </a:p>
@@ -2802,6 +2539,7 @@
               <a:spcBef>
                 <a:spcPts val="1001"/>
               </a:spcBef>
+              <a:buNone/>
             </a:pPr>
             <a:r>
               <a:rPr b="0" lang="en-US" sz="2800" spc="-1" strike="noStrike">
@@ -2853,7 +2591,7 @@
               </a:rPr>
               <a:t>https://youtu.be/ajNiow4596c</a:t>
             </a:r>
-            <a:endParaRPr b="0" lang="en-US" sz="2000" spc="-1" strike="noStrike">
+            <a:endParaRPr b="0" lang="pt-BR" sz="2000" spc="-1" strike="noStrike">
               <a:latin typeface="Arial"/>
             </a:endParaRPr>
           </a:p>
@@ -2865,8 +2603,9 @@
               <a:spcBef>
                 <a:spcPts val="1001"/>
               </a:spcBef>
-            </a:pPr>
-            <a:endParaRPr b="0" lang="en-US" sz="2000" spc="-1" strike="noStrike">
+              <a:buNone/>
+            </a:pPr>
+            <a:endParaRPr b="0" lang="pt-BR" sz="2000" spc="-1" strike="noStrike">
               <a:latin typeface="Arial"/>
             </a:endParaRPr>
           </a:p>
@@ -2878,6 +2617,7 @@
               <a:spcBef>
                 <a:spcPts val="1001"/>
               </a:spcBef>
+              <a:buNone/>
             </a:pPr>
             <a:r>
               <a:rPr b="0" lang="ja-JP" sz="2800" spc="-1" strike="noStrike">
@@ -2929,7 +2669,7 @@
               </a:rPr>
               <a:t>https://youtu.be/ajNiow4596c?t=60</a:t>
             </a:r>
-            <a:endParaRPr b="0" lang="en-US" sz="2000" spc="-1" strike="noStrike">
+            <a:endParaRPr b="0" lang="pt-BR" sz="2000" spc="-1" strike="noStrike">
               <a:latin typeface="Arial"/>
             </a:endParaRPr>
           </a:p>
@@ -2941,8 +2681,9 @@
               <a:spcBef>
                 <a:spcPts val="1001"/>
               </a:spcBef>
-            </a:pPr>
-            <a:endParaRPr b="0" lang="en-US" sz="2000" spc="-1" strike="noStrike">
+              <a:buNone/>
+            </a:pPr>
+            <a:endParaRPr b="0" lang="pt-BR" sz="2000" spc="-1" strike="noStrike">
               <a:latin typeface="Arial"/>
             </a:endParaRPr>
           </a:p>
@@ -2954,6 +2695,7 @@
               <a:spcBef>
                 <a:spcPts val="1001"/>
               </a:spcBef>
+              <a:buNone/>
             </a:pPr>
             <a:r>
               <a:rPr b="0" lang="ja-JP" sz="2800" spc="-1" strike="noStrike">
@@ -2985,7 +2727,7 @@
               </a:rPr>
               <a:t>https://www.pu-Hiroshima.ac.jp/</a:t>
             </a:r>
-            <a:endParaRPr b="0" lang="en-US" sz="2000" spc="-1" strike="noStrike">
+            <a:endParaRPr b="0" lang="pt-BR" sz="2000" spc="-1" strike="noStrike">
               <a:latin typeface="Arial"/>
             </a:endParaRPr>
           </a:p>
@@ -2997,8 +2739,9 @@
               <a:spcBef>
                 <a:spcPts val="1001"/>
               </a:spcBef>
-            </a:pPr>
-            <a:endParaRPr b="0" lang="en-US" sz="2000" spc="-1" strike="noStrike">
+              <a:buNone/>
+            </a:pPr>
+            <a:endParaRPr b="0" lang="pt-BR" sz="2000" spc="-1" strike="noStrike">
               <a:latin typeface="Arial"/>
             </a:endParaRPr>
           </a:p>
@@ -3010,6 +2753,7 @@
               <a:spcBef>
                 <a:spcPts val="1001"/>
               </a:spcBef>
+              <a:buNone/>
             </a:pPr>
             <a:r>
               <a:rPr b="0" lang="ja-JP" sz="2800" spc="-1" strike="noStrike">
@@ -3051,22 +2795,22 @@
               </a:rPr>
               <a:t>https://www.maxonthenet.altervista.org/ppsplit.php</a:t>
             </a:r>
-            <a:endParaRPr b="0" lang="en-US" sz="1600" spc="-1" strike="noStrike">
-              <a:latin typeface="Arial"/>
-            </a:endParaRPr>
-          </a:p>
-        </p:txBody>
-      </p:sp>
-      <p:sp>
-        <p:nvSpPr>
-          <p:cNvPr id="44" name="CustomShape 3"/>
+            <a:endParaRPr b="0" lang="pt-BR" sz="1600" spc="-1" strike="noStrike">
+              <a:latin typeface="Arial"/>
+            </a:endParaRPr>
+          </a:p>
+        </p:txBody>
+      </p:sp>
+      <p:sp>
+        <p:nvSpPr>
+          <p:cNvPr id="43" name="CustomShape 3"/>
           <p:cNvSpPr/>
           <p:nvPr/>
         </p:nvSpPr>
         <p:spPr>
           <a:xfrm>
             <a:off x="5040000" y="5399280"/>
-            <a:ext cx="4875480" cy="394560"/>
+            <a:ext cx="4873680" cy="394560"/>
           </a:xfrm>
           <a:prstGeom prst="rect">
             <a:avLst/>
@@ -3083,7 +2827,7 @@
           <a:fontRef idx="minor"/>
         </p:style>
         <p:txBody>
-          <a:bodyPr lIns="90000" rIns="90000" tIns="45000" bIns="45000">
+          <a:bodyPr lIns="90000" rIns="90000" tIns="45000" bIns="45000" anchor="t">
             <a:spAutoFit/>
           </a:bodyPr>
           <a:p>
@@ -3091,6 +2835,7 @@
               <a:lnSpc>
                 <a:spcPct val="100000"/>
               </a:lnSpc>
+              <a:buNone/>
             </a:pPr>
             <a:r>
               <a:rPr b="0" lang="en-US" sz="2000" spc="-1" strike="noStrike">
@@ -3112,7 +2857,7 @@
               </a:rPr>
               <a:t>プラグイン</a:t>
             </a:r>
-            <a:endParaRPr b="0" lang="en-US" sz="2000" spc="-1" strike="noStrike">
+            <a:endParaRPr b="0" lang="pt-BR" sz="2000" spc="-1" strike="noStrike">
               <a:latin typeface="Arial"/>
             </a:endParaRPr>
           </a:p>
@@ -3150,14 +2895,14 @@
       </p:grpSpPr>
       <p:sp>
         <p:nvSpPr>
-          <p:cNvPr id="45" name="CustomShape 1"/>
+          <p:cNvPr id="44" name="CustomShape 1"/>
           <p:cNvSpPr/>
           <p:nvPr/>
         </p:nvSpPr>
         <p:spPr>
           <a:xfrm>
             <a:off x="1235520" y="504720"/>
-            <a:ext cx="9719640" cy="1757880"/>
+            <a:ext cx="9717840" cy="1756080"/>
           </a:xfrm>
           <a:prstGeom prst="rect">
             <a:avLst/>
@@ -3175,7 +2920,7 @@
         </p:style>
         <p:txBody>
           <a:bodyPr lIns="90000" rIns="90000" tIns="45000" bIns="45000" anchor="b">
-            <a:normAutofit fontScale="49000"/>
+            <a:normAutofit fontScale="79000"/>
           </a:bodyPr>
           <a:p>
             <a:pPr algn="ctr">
@@ -3185,6 +2930,7 @@
               <a:spcBef>
                 <a:spcPts val="1001"/>
               </a:spcBef>
+              <a:buNone/>
             </a:pPr>
             <a:r>
               <a:rPr b="0" lang="ja-JP" sz="4900" spc="-1" strike="noStrike">
@@ -3216,7 +2962,9 @@
               </a:rPr>
               <a:t>共有機能</a:t>
             </a:r>
-            <a:br/>
+            <a:br>
+              <a:rPr sz="1800"/>
+            </a:br>
             <a:r>
               <a:rPr b="0" lang="ja-JP" sz="2800" spc="-1" strike="noStrike">
                 <a:solidFill>
@@ -3267,23 +3015,25 @@
               </a:rPr>
               <a:t>では不可。画面共有でなら可能だが画質が悪い）</a:t>
             </a:r>
-            <a:br/>
-            <a:endParaRPr b="0" lang="en-US" sz="2800" spc="-1" strike="noStrike">
-              <a:latin typeface="Arial"/>
-            </a:endParaRPr>
-          </a:p>
-        </p:txBody>
-      </p:sp>
-      <p:sp>
-        <p:nvSpPr>
-          <p:cNvPr id="46" name="CustomShape 2"/>
+            <a:br>
+              <a:rPr sz="2800"/>
+            </a:br>
+            <a:endParaRPr b="0" lang="pt-BR" sz="2800" spc="-1" strike="noStrike">
+              <a:latin typeface="Arial"/>
+            </a:endParaRPr>
+          </a:p>
+        </p:txBody>
+      </p:sp>
+      <p:sp>
+        <p:nvSpPr>
+          <p:cNvPr id="45" name="CustomShape 2"/>
           <p:cNvSpPr/>
           <p:nvPr/>
         </p:nvSpPr>
         <p:spPr>
           <a:xfrm>
             <a:off x="413640" y="2057400"/>
-            <a:ext cx="11319840" cy="4588200"/>
+            <a:ext cx="11318040" cy="4586400"/>
           </a:xfrm>
           <a:prstGeom prst="rect">
             <a:avLst/>
@@ -3300,7 +3050,7 @@
           <a:fontRef idx="minor"/>
         </p:style>
         <p:txBody>
-          <a:bodyPr lIns="90000" rIns="90000" tIns="45000" bIns="45000">
+          <a:bodyPr lIns="90000" rIns="90000" tIns="45000" bIns="45000" anchor="t">
             <a:normAutofit/>
           </a:bodyPr>
           <a:p>
@@ -3311,8 +3061,9 @@
               <a:spcBef>
                 <a:spcPts val="1001"/>
               </a:spcBef>
-            </a:pPr>
-            <a:endParaRPr b="0" lang="en-US" sz="1800" spc="-1" strike="noStrike">
+              <a:buNone/>
+            </a:pPr>
+            <a:endParaRPr b="0" lang="pt-BR" sz="1800" spc="-1" strike="noStrike">
               <a:latin typeface="Arial"/>
             </a:endParaRPr>
           </a:p>
@@ -3324,8 +3075,9 @@
               <a:spcBef>
                 <a:spcPts val="1001"/>
               </a:spcBef>
-            </a:pPr>
-            <a:endParaRPr b="0" lang="en-US" sz="1800" spc="-1" strike="noStrike">
+              <a:buNone/>
+            </a:pPr>
+            <a:endParaRPr b="0" lang="pt-BR" sz="1800" spc="-1" strike="noStrike">
               <a:latin typeface="Arial"/>
             </a:endParaRPr>
           </a:p>
@@ -3337,8 +3089,9 @@
               <a:spcBef>
                 <a:spcPts val="1001"/>
               </a:spcBef>
-            </a:pPr>
-            <a:endParaRPr b="0" lang="en-US" sz="1800" spc="-1" strike="noStrike">
+              <a:buNone/>
+            </a:pPr>
+            <a:endParaRPr b="0" lang="pt-BR" sz="1800" spc="-1" strike="noStrike">
               <a:latin typeface="Arial"/>
             </a:endParaRPr>
           </a:p>
@@ -3350,6 +3103,7 @@
               <a:spcBef>
                 <a:spcPts val="1001"/>
               </a:spcBef>
+              <a:buNone/>
             </a:pPr>
             <a:r>
               <a:rPr b="0" lang="ja-JP" sz="2800" spc="-1" strike="noStrike">
@@ -3381,7 +3135,7 @@
               </a:rPr>
               <a:t>https://www.pu-Hiroshima.ac.jp/</a:t>
             </a:r>
-            <a:endParaRPr b="0" lang="en-US" sz="2000" spc="-1" strike="noStrike">
+            <a:endParaRPr b="0" lang="pt-BR" sz="2000" spc="-1" strike="noStrike">
               <a:latin typeface="Arial"/>
             </a:endParaRPr>
           </a:p>
@@ -3393,8 +3147,9 @@
               <a:spcBef>
                 <a:spcPts val="1001"/>
               </a:spcBef>
-            </a:pPr>
-            <a:endParaRPr b="0" lang="en-US" sz="2000" spc="-1" strike="noStrike">
+              <a:buNone/>
+            </a:pPr>
+            <a:endParaRPr b="0" lang="pt-BR" sz="2000" spc="-1" strike="noStrike">
               <a:latin typeface="Arial"/>
             </a:endParaRPr>
           </a:p>
@@ -3406,6 +3161,7 @@
               <a:spcBef>
                 <a:spcPts val="1001"/>
               </a:spcBef>
+              <a:buNone/>
             </a:pPr>
             <a:r>
               <a:rPr b="0" lang="ja-JP" sz="2800" spc="-1" strike="noStrike">
@@ -3447,22 +3203,22 @@
               </a:rPr>
               <a:t>https://www.maxonthenet.altervista.org/ppsplit.php</a:t>
             </a:r>
-            <a:endParaRPr b="0" lang="en-US" sz="1600" spc="-1" strike="noStrike">
-              <a:latin typeface="Arial"/>
-            </a:endParaRPr>
-          </a:p>
-        </p:txBody>
-      </p:sp>
-      <p:sp>
-        <p:nvSpPr>
-          <p:cNvPr id="47" name="CustomShape 3"/>
+            <a:endParaRPr b="0" lang="pt-BR" sz="1600" spc="-1" strike="noStrike">
+              <a:latin typeface="Arial"/>
+            </a:endParaRPr>
+          </a:p>
+        </p:txBody>
+      </p:sp>
+      <p:sp>
+        <p:nvSpPr>
+          <p:cNvPr id="46" name="CustomShape 3"/>
           <p:cNvSpPr/>
           <p:nvPr/>
         </p:nvSpPr>
         <p:spPr>
           <a:xfrm>
             <a:off x="5040000" y="5399280"/>
-            <a:ext cx="4875480" cy="394560"/>
+            <a:ext cx="4873680" cy="394560"/>
           </a:xfrm>
           <a:prstGeom prst="rect">
             <a:avLst/>
@@ -3479,7 +3235,7 @@
           <a:fontRef idx="minor"/>
         </p:style>
         <p:txBody>
-          <a:bodyPr lIns="90000" rIns="90000" tIns="45000" bIns="45000">
+          <a:bodyPr lIns="90000" rIns="90000" tIns="45000" bIns="45000" anchor="t">
             <a:spAutoFit/>
           </a:bodyPr>
           <a:p>
@@ -3487,6 +3243,7 @@
               <a:lnSpc>
                 <a:spcPct val="100000"/>
               </a:lnSpc>
+              <a:buNone/>
             </a:pPr>
             <a:r>
               <a:rPr b="0" lang="en-US" sz="2000" spc="-1" strike="noStrike">
@@ -3508,7 +3265,7 @@
               </a:rPr>
               <a:t>プラグイン</a:t>
             </a:r>
-            <a:endParaRPr b="0" lang="en-US" sz="2000" spc="-1" strike="noStrike">
+            <a:endParaRPr b="0" lang="pt-BR" sz="2000" spc="-1" strike="noStrike">
               <a:latin typeface="Arial"/>
             </a:endParaRPr>
           </a:p>
@@ -3546,14 +3303,14 @@
       </p:grpSpPr>
       <p:sp>
         <p:nvSpPr>
-          <p:cNvPr id="48" name="CustomShape 1"/>
+          <p:cNvPr id="47" name="CustomShape 1"/>
           <p:cNvSpPr/>
           <p:nvPr/>
         </p:nvSpPr>
         <p:spPr>
           <a:xfrm>
             <a:off x="1440000" y="648000"/>
-            <a:ext cx="9575280" cy="2951280"/>
+            <a:ext cx="9573480" cy="2949480"/>
           </a:xfrm>
           <a:prstGeom prst="rect">
             <a:avLst/>
@@ -3576,14 +3333,14 @@
       </p:sp>
       <p:sp>
         <p:nvSpPr>
-          <p:cNvPr id="49" name="CustomShape 2"/>
+          <p:cNvPr id="48" name="CustomShape 2"/>
           <p:cNvSpPr/>
           <p:nvPr/>
         </p:nvSpPr>
         <p:spPr>
           <a:xfrm>
             <a:off x="1368000" y="3096000"/>
-            <a:ext cx="8999640" cy="1439640"/>
+            <a:ext cx="8997840" cy="1437840"/>
           </a:xfrm>
           <a:prstGeom prst="rect">
             <a:avLst/>
@@ -3606,14 +3363,14 @@
       </p:sp>
       <p:sp>
         <p:nvSpPr>
-          <p:cNvPr id="50" name="CustomShape 3"/>
+          <p:cNvPr id="49" name="CustomShape 3"/>
           <p:cNvSpPr/>
           <p:nvPr/>
         </p:nvSpPr>
         <p:spPr>
           <a:xfrm>
             <a:off x="1235520" y="504720"/>
-            <a:ext cx="9719640" cy="1757880"/>
+            <a:ext cx="9717840" cy="1756080"/>
           </a:xfrm>
           <a:prstGeom prst="rect">
             <a:avLst/>
@@ -3631,7 +3388,7 @@
         </p:style>
         <p:txBody>
           <a:bodyPr lIns="90000" rIns="90000" tIns="45000" bIns="45000" anchor="b">
-            <a:normAutofit fontScale="66000"/>
+            <a:normAutofit fontScale="81000"/>
           </a:bodyPr>
           <a:p>
             <a:pPr algn="ctr">
@@ -3641,6 +3398,7 @@
               <a:spcBef>
                 <a:spcPts val="1001"/>
               </a:spcBef>
+              <a:buNone/>
             </a:pPr>
             <a:r>
               <a:rPr b="0" lang="ja-JP" sz="4900" spc="-1" strike="noStrike">
@@ -3672,7 +3430,9 @@
               </a:rPr>
               <a:t>共有機能</a:t>
             </a:r>
-            <a:br/>
+            <a:br>
+              <a:rPr sz="1800"/>
+            </a:br>
             <a:r>
               <a:rPr b="0" lang="ja-JP" sz="2800" spc="-1" strike="noStrike">
                 <a:solidFill>
@@ -3723,23 +3483,25 @@
               </a:rPr>
               <a:t>では不可。画面共有でなら可能だが画質が悪い）</a:t>
             </a:r>
-            <a:br/>
-            <a:endParaRPr b="0" lang="en-US" sz="2800" spc="-1" strike="noStrike">
-              <a:latin typeface="Arial"/>
-            </a:endParaRPr>
-          </a:p>
-        </p:txBody>
-      </p:sp>
-      <p:sp>
-        <p:nvSpPr>
-          <p:cNvPr id="51" name="CustomShape 4"/>
+            <a:br>
+              <a:rPr sz="2800"/>
+            </a:br>
+            <a:endParaRPr b="0" lang="pt-BR" sz="2800" spc="-1" strike="noStrike">
+              <a:latin typeface="Arial"/>
+            </a:endParaRPr>
+          </a:p>
+        </p:txBody>
+      </p:sp>
+      <p:sp>
+        <p:nvSpPr>
+          <p:cNvPr id="50" name="CustomShape 4"/>
           <p:cNvSpPr/>
           <p:nvPr/>
         </p:nvSpPr>
         <p:spPr>
           <a:xfrm>
             <a:off x="413640" y="2057400"/>
-            <a:ext cx="11319840" cy="4588200"/>
+            <a:ext cx="11318040" cy="4586400"/>
           </a:xfrm>
           <a:prstGeom prst="rect">
             <a:avLst/>
@@ -3756,7 +3518,7 @@
           <a:fontRef idx="minor"/>
         </p:style>
         <p:txBody>
-          <a:bodyPr lIns="90000" rIns="90000" tIns="45000" bIns="45000">
+          <a:bodyPr lIns="90000" rIns="90000" tIns="45000" bIns="45000" anchor="t">
             <a:normAutofit/>
           </a:bodyPr>
           <a:p>
@@ -3767,8 +3529,9 @@
               <a:spcBef>
                 <a:spcPts val="1001"/>
               </a:spcBef>
-            </a:pPr>
-            <a:endParaRPr b="0" lang="en-US" sz="1800" spc="-1" strike="noStrike">
+              <a:buNone/>
+            </a:pPr>
+            <a:endParaRPr b="0" lang="pt-BR" sz="1800" spc="-1" strike="noStrike">
               <a:latin typeface="Arial"/>
             </a:endParaRPr>
           </a:p>
@@ -3780,6 +3543,7 @@
               <a:spcBef>
                 <a:spcPts val="1001"/>
               </a:spcBef>
+              <a:buNone/>
             </a:pPr>
             <a:r>
               <a:rPr b="0" lang="en-US" sz="2800" spc="-1" strike="noStrike">
@@ -3851,7 +3615,7 @@
               </a:rPr>
               <a:t>https://youtu.be/ajNiow4596c</a:t>
             </a:r>
-            <a:endParaRPr b="0" lang="en-US" sz="2000" spc="-1" strike="noStrike">
+            <a:endParaRPr b="0" lang="pt-BR" sz="2000" spc="-1" strike="noStrike">
               <a:latin typeface="Arial"/>
             </a:endParaRPr>
           </a:p>
@@ -3863,8 +3627,9 @@
               <a:spcBef>
                 <a:spcPts val="1001"/>
               </a:spcBef>
-            </a:pPr>
-            <a:endParaRPr b="0" lang="en-US" sz="2000" spc="-1" strike="noStrike">
+              <a:buNone/>
+            </a:pPr>
+            <a:endParaRPr b="0" lang="pt-BR" sz="2000" spc="-1" strike="noStrike">
               <a:latin typeface="Arial"/>
             </a:endParaRPr>
           </a:p>
@@ -3876,6 +3641,7 @@
               <a:spcBef>
                 <a:spcPts val="1001"/>
               </a:spcBef>
+              <a:buNone/>
             </a:pPr>
             <a:r>
               <a:rPr b="0" lang="ja-JP" sz="2800" spc="-1" strike="noStrike">
@@ -3947,7 +3713,7 @@
               </a:rPr>
               <a:t>jNiow4596c?t=60</a:t>
             </a:r>
-            <a:endParaRPr b="0" lang="en-US" sz="2000" spc="-1" strike="noStrike">
+            <a:endParaRPr b="0" lang="pt-BR" sz="2000" spc="-1" strike="noStrike">
               <a:latin typeface="Arial"/>
             </a:endParaRPr>
           </a:p>
@@ -3959,8 +3725,9 @@
               <a:spcBef>
                 <a:spcPts val="1001"/>
               </a:spcBef>
-            </a:pPr>
-            <a:endParaRPr b="0" lang="en-US" sz="2000" spc="-1" strike="noStrike">
+              <a:buNone/>
+            </a:pPr>
+            <a:endParaRPr b="0" lang="pt-BR" sz="2000" spc="-1" strike="noStrike">
               <a:latin typeface="Arial"/>
             </a:endParaRPr>
           </a:p>
@@ -3972,23 +3739,24 @@
               <a:spcBef>
                 <a:spcPts val="1001"/>
               </a:spcBef>
-            </a:pPr>
-            <a:endParaRPr b="0" lang="en-US" sz="2000" spc="-1" strike="noStrike">
-              <a:latin typeface="Arial"/>
-            </a:endParaRPr>
-          </a:p>
-        </p:txBody>
-      </p:sp>
-      <p:sp>
-        <p:nvSpPr>
-          <p:cNvPr id="52" name="CustomShape 5"/>
+              <a:buNone/>
+            </a:pPr>
+            <a:endParaRPr b="0" lang="pt-BR" sz="2000" spc="-1" strike="noStrike">
+              <a:latin typeface="Arial"/>
+            </a:endParaRPr>
+          </a:p>
+        </p:txBody>
+      </p:sp>
+      <p:sp>
+        <p:nvSpPr>
+          <p:cNvPr id="51" name="CustomShape 5"/>
           <p:cNvSpPr/>
           <p:nvPr/>
         </p:nvSpPr>
         <p:spPr>
           <a:xfrm>
             <a:off x="5040000" y="5399280"/>
-            <a:ext cx="4875480" cy="394560"/>
+            <a:ext cx="4873680" cy="394560"/>
           </a:xfrm>
           <a:prstGeom prst="rect">
             <a:avLst/>
@@ -4005,7 +3773,7 @@
           <a:fontRef idx="minor"/>
         </p:style>
         <p:txBody>
-          <a:bodyPr lIns="90000" rIns="90000" tIns="45000" bIns="45000">
+          <a:bodyPr lIns="90000" rIns="90000" tIns="45000" bIns="45000" anchor="t">
             <a:spAutoFit/>
           </a:bodyPr>
           <a:p>
@@ -4013,6 +3781,7 @@
               <a:lnSpc>
                 <a:spcPct val="100000"/>
               </a:lnSpc>
+              <a:buNone/>
             </a:pPr>
             <a:r>
               <a:rPr b="0" lang="en-US" sz="2000" spc="-1" strike="noStrike">
@@ -4034,7 +3803,7 @@
               </a:rPr>
               <a:t>プラグイン</a:t>
             </a:r>
-            <a:endParaRPr b="0" lang="en-US" sz="2000" spc="-1" strike="noStrike">
+            <a:endParaRPr b="0" lang="pt-BR" sz="2000" spc="-1" strike="noStrike">
               <a:latin typeface="Arial"/>
             </a:endParaRPr>
           </a:p>
@@ -4072,14 +3841,14 @@
       </p:grpSpPr>
       <p:sp>
         <p:nvSpPr>
-          <p:cNvPr id="53" name="CustomShape 1"/>
+          <p:cNvPr id="52" name="CustomShape 1"/>
           <p:cNvSpPr/>
           <p:nvPr/>
         </p:nvSpPr>
         <p:spPr>
           <a:xfrm>
             <a:off x="540000" y="91800"/>
-            <a:ext cx="10666440" cy="4588200"/>
+            <a:ext cx="10664640" cy="4586400"/>
           </a:xfrm>
           <a:prstGeom prst="rect">
             <a:avLst/>
@@ -4096,24 +3865,20 @@
           <a:fontRef idx="minor"/>
         </p:style>
         <p:txBody>
-          <a:bodyPr lIns="90000" rIns="90000" tIns="45000" bIns="45000">
-            <a:normAutofit fontScale="61000"/>
-          </a:bodyPr>
-          <a:p>
-            <a:pPr marL="457200" indent="-455760">
-              <a:lnSpc>
-                <a:spcPct val="90000"/>
-              </a:lnSpc>
-              <a:spcBef>
-                <a:spcPts val="1001"/>
-              </a:spcBef>
-              <a:buClr>
-                <a:srgbClr val="000000"/>
-              </a:buClr>
-              <a:buFont typeface="Arial"/>
-              <a:buChar char="•"/>
-            </a:pPr>
-            <a:endParaRPr b="0" lang="en-US" sz="1800" spc="-1" strike="noStrike">
+          <a:bodyPr lIns="90000" rIns="90000" tIns="45000" bIns="45000" anchor="t">
+            <a:normAutofit fontScale="74000"/>
+          </a:bodyPr>
+          <a:p>
+            <a:pPr>
+              <a:lnSpc>
+                <a:spcPct val="90000"/>
+              </a:lnSpc>
+              <a:spcBef>
+                <a:spcPts val="1001"/>
+              </a:spcBef>
+              <a:buNone/>
+            </a:pPr>
+            <a:endParaRPr b="0" lang="pt-BR" sz="1800" spc="-1" strike="noStrike">
               <a:latin typeface="Arial"/>
             </a:endParaRPr>
           </a:p>
@@ -4141,7 +3906,7 @@
               </a:rPr>
               <a:t>はい</a:t>
             </a:r>
-            <a:endParaRPr b="0" lang="en-US" sz="700" spc="-1" strike="noStrike">
+            <a:endParaRPr b="0" lang="pt-BR" sz="700" spc="-1" strike="noStrike">
               <a:latin typeface="Arial"/>
             </a:endParaRPr>
           </a:p>
@@ -4169,7 +3934,7 @@
               </a:rPr>
               <a:t>いいえ</a:t>
             </a:r>
-            <a:endParaRPr b="0" lang="en-US" sz="700" spc="-1" strike="noStrike">
+            <a:endParaRPr b="0" lang="pt-BR" sz="700" spc="-1" strike="noStrike">
               <a:latin typeface="Arial"/>
             </a:endParaRPr>
           </a:p>
@@ -4197,7 +3962,7 @@
               </a:rPr>
               <a:t>どちらでもない</a:t>
             </a:r>
-            <a:endParaRPr b="0" lang="en-US" sz="700" spc="-1" strike="noStrike">
+            <a:endParaRPr b="0" lang="pt-BR" sz="700" spc="-1" strike="noStrike">
               <a:latin typeface="Arial"/>
             </a:endParaRPr>
           </a:p>
@@ -4225,7 +3990,7 @@
               </a:rPr>
               <a:t>あいうえお</a:t>
             </a:r>
-            <a:endParaRPr b="0" lang="en-US" sz="700" spc="-1" strike="noStrike">
+            <a:endParaRPr b="0" lang="pt-BR" sz="700" spc="-1" strike="noStrike">
               <a:latin typeface="Arial"/>
             </a:endParaRPr>
           </a:p>
@@ -4253,7 +4018,7 @@
               </a:rPr>
               <a:t>各区けお</a:t>
             </a:r>
-            <a:endParaRPr b="0" lang="en-US" sz="700" spc="-1" strike="noStrike">
+            <a:endParaRPr b="0" lang="pt-BR" sz="700" spc="-1" strike="noStrike">
               <a:latin typeface="Arial"/>
             </a:endParaRPr>
           </a:p>
@@ -4281,7 +4046,7 @@
               </a:rPr>
               <a:t>ｋｓｋｓｌｋ</a:t>
             </a:r>
-            <a:endParaRPr b="0" lang="en-US" sz="700" spc="-1" strike="noStrike">
+            <a:endParaRPr b="0" lang="pt-BR" sz="700" spc="-1" strike="noStrike">
               <a:latin typeface="Arial"/>
             </a:endParaRPr>
           </a:p>
@@ -4309,7 +4074,7 @@
               </a:rPr>
               <a:t>かきくけ</a:t>
             </a:r>
-            <a:endParaRPr b="0" lang="en-US" sz="700" spc="-1" strike="noStrike">
+            <a:endParaRPr b="0" lang="pt-BR" sz="700" spc="-1" strike="noStrike">
               <a:latin typeface="Arial"/>
             </a:endParaRPr>
           </a:p>
@@ -4337,7 +4102,7 @@
               </a:rPr>
               <a:t>さしすせ</a:t>
             </a:r>
-            <a:endParaRPr b="0" lang="en-US" sz="700" spc="-1" strike="noStrike">
+            <a:endParaRPr b="0" lang="pt-BR" sz="700" spc="-1" strike="noStrike">
               <a:latin typeface="Arial"/>
             </a:endParaRPr>
           </a:p>
@@ -4365,7 +4130,7 @@
               </a:rPr>
               <a:t>たちつて</a:t>
             </a:r>
-            <a:endParaRPr b="0" lang="en-US" sz="700" spc="-1" strike="noStrike">
+            <a:endParaRPr b="0" lang="pt-BR" sz="700" spc="-1" strike="noStrike">
               <a:latin typeface="Arial"/>
             </a:endParaRPr>
           </a:p>
@@ -4393,7 +4158,7 @@
               </a:rPr>
               <a:t>なにぬねｍぽ</a:t>
             </a:r>
-            <a:endParaRPr b="0" lang="en-US" sz="700" spc="-1" strike="noStrike">
+            <a:endParaRPr b="0" lang="pt-BR" sz="700" spc="-1" strike="noStrike">
               <a:latin typeface="Arial"/>
             </a:endParaRPr>
           </a:p>
@@ -4421,7 +4186,7 @@
               </a:rPr>
               <a:t>はいｈじるえお</a:t>
             </a:r>
-            <a:endParaRPr b="0" lang="en-US" sz="700" spc="-1" strike="noStrike">
+            <a:endParaRPr b="0" lang="pt-BR" sz="700" spc="-1" strike="noStrike">
               <a:latin typeface="Arial"/>
             </a:endParaRPr>
           </a:p>
@@ -4449,7 +4214,7 @@
               </a:rPr>
               <a:t>はひふへほ</a:t>
             </a:r>
-            <a:endParaRPr b="0" lang="en-US" sz="700" spc="-1" strike="noStrike">
+            <a:endParaRPr b="0" lang="pt-BR" sz="700" spc="-1" strike="noStrike">
               <a:latin typeface="Arial"/>
             </a:endParaRPr>
           </a:p>
@@ -4477,7 +4242,7 @@
               </a:rPr>
               <a:t>かしひおｋしおいｓかお</a:t>
             </a:r>
-            <a:endParaRPr b="0" lang="en-US" sz="700" spc="-1" strike="noStrike">
+            <a:endParaRPr b="0" lang="pt-BR" sz="700" spc="-1" strike="noStrike">
               <a:latin typeface="Arial"/>
             </a:endParaRPr>
           </a:p>
@@ -4505,7 +4270,7 @@
               </a:rPr>
               <a:t>じゃｓぁｌｋｓｄじょあそお</a:t>
             </a:r>
-            <a:endParaRPr b="0" lang="en-US" sz="700" spc="-1" strike="noStrike">
+            <a:endParaRPr b="0" lang="pt-BR" sz="700" spc="-1" strike="noStrike">
               <a:latin typeface="Arial"/>
             </a:endParaRPr>
           </a:p>
@@ -4533,7 +4298,7 @@
               </a:rPr>
               <a:t>あそあおかおあおだこお</a:t>
             </a:r>
-            <a:endParaRPr b="0" lang="en-US" sz="700" spc="-1" strike="noStrike">
+            <a:endParaRPr b="0" lang="pt-BR" sz="700" spc="-1" strike="noStrike">
               <a:latin typeface="Arial"/>
             </a:endParaRPr>
           </a:p>
@@ -4561,7 +4326,7 @@
               </a:rPr>
               <a:t>ああｋどこｋはいお</a:t>
             </a:r>
-            <a:endParaRPr b="0" lang="en-US" sz="700" spc="-1" strike="noStrike">
+            <a:endParaRPr b="0" lang="pt-BR" sz="700" spc="-1" strike="noStrike">
               <a:latin typeface="Arial"/>
             </a:endParaRPr>
           </a:p>
@@ -4589,7 +4354,7 @@
               </a:rPr>
               <a:t>あいうえお</a:t>
             </a:r>
-            <a:endParaRPr b="0" lang="en-US" sz="700" spc="-1" strike="noStrike">
+            <a:endParaRPr b="0" lang="pt-BR" sz="700" spc="-1" strike="noStrike">
               <a:latin typeface="Arial"/>
             </a:endParaRPr>
           </a:p>
@@ -4617,7 +4382,7 @@
               </a:rPr>
               <a:t>なにぬねの</a:t>
             </a:r>
-            <a:endParaRPr b="0" lang="en-US" sz="700" spc="-1" strike="noStrike">
+            <a:endParaRPr b="0" lang="pt-BR" sz="700" spc="-1" strike="noStrike">
               <a:latin typeface="Arial"/>
             </a:endParaRPr>
           </a:p>
@@ -4645,7 +4410,7 @@
               </a:rPr>
               <a:t>ぱぽぷぺｋ</a:t>
             </a:r>
-            <a:endParaRPr b="0" lang="en-US" sz="700" spc="-1" strike="noStrike">
+            <a:endParaRPr b="0" lang="pt-BR" sz="700" spc="-1" strike="noStrike">
               <a:latin typeface="Arial"/>
             </a:endParaRPr>
           </a:p>
@@ -4673,7 +4438,7 @@
               </a:rPr>
               <a:t>ぱぴっぷぺぽ</a:t>
             </a:r>
-            <a:endParaRPr b="0" lang="en-US" sz="700" spc="-1" strike="noStrike">
+            <a:endParaRPr b="0" lang="pt-BR" sz="700" spc="-1" strike="noStrike">
               <a:latin typeface="Arial"/>
             </a:endParaRPr>
           </a:p>
@@ -4701,7 +4466,7 @@
               </a:rPr>
               <a:t>あああああああいい</a:t>
             </a:r>
-            <a:endParaRPr b="0" lang="en-US" sz="700" spc="-1" strike="noStrike">
+            <a:endParaRPr b="0" lang="pt-BR" sz="700" spc="-1" strike="noStrike">
               <a:latin typeface="Arial"/>
             </a:endParaRPr>
           </a:p>
@@ -4729,7 +4494,7 @@
               </a:rPr>
               <a:t>いいいいいいいいい</a:t>
             </a:r>
-            <a:endParaRPr b="0" lang="en-US" sz="700" spc="-1" strike="noStrike">
+            <a:endParaRPr b="0" lang="pt-BR" sz="700" spc="-1" strike="noStrike">
               <a:latin typeface="Arial"/>
             </a:endParaRPr>
           </a:p>
@@ -4757,7 +4522,7 @@
               </a:rPr>
               <a:t>えええええええええ</a:t>
             </a:r>
-            <a:endParaRPr b="0" lang="en-US" sz="700" spc="-1" strike="noStrike">
+            <a:endParaRPr b="0" lang="pt-BR" sz="700" spc="-1" strike="noStrike">
               <a:latin typeface="Arial"/>
             </a:endParaRPr>
           </a:p>
@@ -4785,7 +4550,7 @@
               </a:rPr>
               <a:t>おおおおおおおお</a:t>
             </a:r>
-            <a:endParaRPr b="0" lang="en-US" sz="700" spc="-1" strike="noStrike">
+            <a:endParaRPr b="0" lang="pt-BR" sz="700" spc="-1" strike="noStrike">
               <a:latin typeface="Arial"/>
             </a:endParaRPr>
           </a:p>
@@ -4813,7 +4578,7 @@
               </a:rPr>
               <a:t>んんんんんんんｎ</a:t>
             </a:r>
-            <a:endParaRPr b="0" lang="en-US" sz="700" spc="-1" strike="noStrike">
+            <a:endParaRPr b="0" lang="pt-BR" sz="700" spc="-1" strike="noStrike">
               <a:latin typeface="Arial"/>
             </a:endParaRPr>
           </a:p>
@@ -4841,7 +4606,7 @@
               </a:rPr>
               <a:t> </a:t>
             </a:r>
-            <a:endParaRPr b="0" lang="en-US" sz="700" spc="-1" strike="noStrike">
+            <a:endParaRPr b="0" lang="pt-BR" sz="700" spc="-1" strike="noStrike">
               <a:latin typeface="Arial"/>
             </a:endParaRPr>
           </a:p>

</xml_diff>